<commit_message>
Update roadmap info and add notes
</commit_message>
<xml_diff>
--- a/2024/0320_BostonDotNetArch/GetStartedWithWinUI3.pptx
+++ b/2024/0320_BostonDotNetArch/GetStartedWithWinUI3.pptx
@@ -1049,15 +1049,15 @@
 </file>
 
 <file path=ppt/diagrams/colors2.xml><?xml version="1.0" encoding="utf-8"?>
-<dgm:colorsDef xmlns:dgm="http://schemas.openxmlformats.org/drawingml/2006/diagram" xmlns:a="http://schemas.openxmlformats.org/drawingml/2006/main" uniqueId="urn:microsoft.com/office/officeart/2005/8/colors/accent1_2">
+<dgm:colorsDef xmlns:dgm="http://schemas.openxmlformats.org/drawingml/2006/diagram" xmlns:a="http://schemas.openxmlformats.org/drawingml/2006/main" uniqueId="urn:microsoft.com/office/officeart/2005/8/colors/colorful5">
   <dgm:title val=""/>
   <dgm:desc val=""/>
   <dgm:catLst>
-    <dgm:cat type="accent1" pri="11200"/>
+    <dgm:cat type="colorful" pri="10500"/>
   </dgm:catLst>
   <dgm:styleLbl name="node0">
     <dgm:fillClrLst meth="repeat">
-      <a:schemeClr val="accent1"/>
+      <a:schemeClr val="accent4"/>
     </dgm:fillClrLst>
     <dgm:linClrLst meth="repeat">
       <a:schemeClr val="lt1"/>
@@ -1067,21 +1067,10 @@
     <dgm:txFillClrLst/>
     <dgm:txEffectClrLst/>
   </dgm:styleLbl>
-  <dgm:styleLbl name="alignNode1">
-    <dgm:fillClrLst meth="repeat">
-      <a:schemeClr val="accent1"/>
-    </dgm:fillClrLst>
-    <dgm:linClrLst meth="repeat">
-      <a:schemeClr val="accent1"/>
-    </dgm:linClrLst>
-    <dgm:effectClrLst/>
-    <dgm:txLinClrLst/>
-    <dgm:txFillClrLst/>
-    <dgm:txEffectClrLst/>
-  </dgm:styleLbl>
   <dgm:styleLbl name="node1">
-    <dgm:fillClrLst meth="repeat">
-      <a:schemeClr val="accent1"/>
+    <dgm:fillClrLst>
+      <a:schemeClr val="accent5"/>
+      <a:schemeClr val="accent6"/>
     </dgm:fillClrLst>
     <dgm:linClrLst meth="repeat">
       <a:schemeClr val="lt1"/>
@@ -1091,9 +1080,24 @@
     <dgm:txFillClrLst/>
     <dgm:txEffectClrLst/>
   </dgm:styleLbl>
+  <dgm:styleLbl name="alignNode1">
+    <dgm:fillClrLst>
+      <a:schemeClr val="accent5"/>
+      <a:schemeClr val="accent6"/>
+    </dgm:fillClrLst>
+    <dgm:linClrLst>
+      <a:schemeClr val="accent5"/>
+      <a:schemeClr val="accent6"/>
+    </dgm:linClrLst>
+    <dgm:effectClrLst/>
+    <dgm:txLinClrLst/>
+    <dgm:txFillClrLst/>
+    <dgm:txEffectClrLst/>
+  </dgm:styleLbl>
   <dgm:styleLbl name="lnNode1">
-    <dgm:fillClrLst meth="repeat">
-      <a:schemeClr val="accent1"/>
+    <dgm:fillClrLst>
+      <a:schemeClr val="accent5"/>
+      <a:schemeClr val="accent6"/>
     </dgm:fillClrLst>
     <dgm:linClrLst meth="repeat">
       <a:schemeClr val="lt1"/>
@@ -1104,8 +1108,11 @@
     <dgm:txEffectClrLst/>
   </dgm:styleLbl>
   <dgm:styleLbl name="vennNode1">
-    <dgm:fillClrLst meth="repeat">
-      <a:schemeClr val="accent1">
+    <dgm:fillClrLst>
+      <a:schemeClr val="accent5">
+        <a:alpha val="50000"/>
+      </a:schemeClr>
+      <a:schemeClr val="accent6">
         <a:alpha val="50000"/>
       </a:schemeClr>
     </dgm:fillClrLst>
@@ -1118,7 +1125,19 @@
     <dgm:txEffectClrLst/>
   </dgm:styleLbl>
   <dgm:styleLbl name="node2">
-    <dgm:fillClrLst meth="repeat">
+    <dgm:fillClrLst>
+      <a:schemeClr val="accent6"/>
+    </dgm:fillClrLst>
+    <dgm:linClrLst meth="repeat">
+      <a:schemeClr val="lt1"/>
+    </dgm:linClrLst>
+    <dgm:effectClrLst/>
+    <dgm:txLinClrLst/>
+    <dgm:txFillClrLst/>
+    <dgm:txEffectClrLst/>
+  </dgm:styleLbl>
+  <dgm:styleLbl name="node3">
+    <dgm:fillClrLst>
       <a:schemeClr val="accent1"/>
     </dgm:fillClrLst>
     <dgm:linClrLst meth="repeat">
@@ -1129,9 +1148,9 @@
     <dgm:txFillClrLst/>
     <dgm:txEffectClrLst/>
   </dgm:styleLbl>
-  <dgm:styleLbl name="node3">
-    <dgm:fillClrLst meth="repeat">
-      <a:schemeClr val="accent1"/>
+  <dgm:styleLbl name="node4">
+    <dgm:fillClrLst>
+      <a:schemeClr val="accent2"/>
     </dgm:fillClrLst>
     <dgm:linClrLst meth="repeat">
       <a:schemeClr val="lt1"/>
@@ -1141,21 +1160,12 @@
     <dgm:txFillClrLst/>
     <dgm:txEffectClrLst/>
   </dgm:styleLbl>
-  <dgm:styleLbl name="node4">
-    <dgm:fillClrLst meth="repeat">
-      <a:schemeClr val="accent1"/>
-    </dgm:fillClrLst>
-    <dgm:linClrLst meth="repeat">
-      <a:schemeClr val="lt1"/>
-    </dgm:linClrLst>
-    <dgm:effectClrLst/>
-    <dgm:txLinClrLst/>
-    <dgm:txFillClrLst/>
-    <dgm:txEffectClrLst/>
-  </dgm:styleLbl>
   <dgm:styleLbl name="fgImgPlace1">
-    <dgm:fillClrLst meth="repeat">
-      <a:schemeClr val="accent1">
+    <dgm:fillClrLst>
+      <a:schemeClr val="accent5">
+        <a:tint val="50000"/>
+      </a:schemeClr>
+      <a:schemeClr val="accent6">
         <a:tint val="50000"/>
       </a:schemeClr>
     </dgm:fillClrLst>
@@ -1170,9 +1180,12 @@
     <dgm:txEffectClrLst/>
   </dgm:styleLbl>
   <dgm:styleLbl name="alignImgPlace1">
-    <dgm:fillClrLst meth="repeat">
-      <a:schemeClr val="accent1">
+    <dgm:fillClrLst>
+      <a:schemeClr val="accent5">
         <a:tint val="50000"/>
+      </a:schemeClr>
+      <a:schemeClr val="accent6">
+        <a:tint val="20000"/>
       </a:schemeClr>
     </dgm:fillClrLst>
     <dgm:linClrLst meth="repeat">
@@ -1186,9 +1199,12 @@
     <dgm:txEffectClrLst/>
   </dgm:styleLbl>
   <dgm:styleLbl name="bgImgPlace1">
-    <dgm:fillClrLst meth="repeat">
-      <a:schemeClr val="accent1">
+    <dgm:fillClrLst>
+      <a:schemeClr val="accent5">
         <a:tint val="50000"/>
+      </a:schemeClr>
+      <a:schemeClr val="accent6">
+        <a:tint val="20000"/>
       </a:schemeClr>
     </dgm:fillClrLst>
     <dgm:linClrLst meth="repeat">
@@ -1202,14 +1218,84 @@
     <dgm:txEffectClrLst/>
   </dgm:styleLbl>
   <dgm:styleLbl name="sibTrans2D1">
-    <dgm:fillClrLst meth="repeat">
-      <a:schemeClr val="accent1">
-        <a:tint val="60000"/>
-      </a:schemeClr>
+    <dgm:fillClrLst>
+      <a:schemeClr val="accent5"/>
+      <a:schemeClr val="accent6"/>
     </dgm:fillClrLst>
     <dgm:linClrLst meth="repeat">
-      <a:schemeClr val="accent1">
-        <a:tint val="60000"/>
+      <a:schemeClr val="lt1"/>
+    </dgm:linClrLst>
+    <dgm:effectClrLst/>
+    <dgm:txLinClrLst/>
+    <dgm:txFillClrLst/>
+    <dgm:txEffectClrLst/>
+  </dgm:styleLbl>
+  <dgm:styleLbl name="fgSibTrans2D1">
+    <dgm:fillClrLst>
+      <a:schemeClr val="accent5"/>
+      <a:schemeClr val="accent6"/>
+    </dgm:fillClrLst>
+    <dgm:linClrLst meth="repeat">
+      <a:schemeClr val="lt1"/>
+    </dgm:linClrLst>
+    <dgm:effectClrLst/>
+    <dgm:txLinClrLst/>
+    <dgm:txFillClrLst meth="repeat">
+      <a:schemeClr val="lt1"/>
+    </dgm:txFillClrLst>
+    <dgm:txEffectClrLst/>
+  </dgm:styleLbl>
+  <dgm:styleLbl name="bgSibTrans2D1">
+    <dgm:fillClrLst>
+      <a:schemeClr val="accent5"/>
+      <a:schemeClr val="accent6"/>
+    </dgm:fillClrLst>
+    <dgm:linClrLst meth="repeat">
+      <a:schemeClr val="lt1"/>
+    </dgm:linClrLst>
+    <dgm:effectClrLst/>
+    <dgm:txLinClrLst/>
+    <dgm:txFillClrLst meth="repeat">
+      <a:schemeClr val="lt1"/>
+    </dgm:txFillClrLst>
+    <dgm:txEffectClrLst/>
+  </dgm:styleLbl>
+  <dgm:styleLbl name="sibTrans1D1">
+    <dgm:fillClrLst/>
+    <dgm:linClrLst>
+      <a:schemeClr val="accent5"/>
+      <a:schemeClr val="accent6"/>
+    </dgm:linClrLst>
+    <dgm:effectClrLst/>
+    <dgm:txLinClrLst/>
+    <dgm:txFillClrLst meth="repeat">
+      <a:schemeClr val="tx1"/>
+    </dgm:txFillClrLst>
+    <dgm:txEffectClrLst/>
+  </dgm:styleLbl>
+  <dgm:styleLbl name="callout">
+    <dgm:fillClrLst meth="repeat">
+      <a:schemeClr val="accent5"/>
+    </dgm:fillClrLst>
+    <dgm:linClrLst meth="repeat">
+      <a:schemeClr val="accent5">
+        <a:tint val="50000"/>
+      </a:schemeClr>
+    </dgm:linClrLst>
+    <dgm:effectClrLst/>
+    <dgm:txLinClrLst/>
+    <dgm:txFillClrLst meth="repeat">
+      <a:schemeClr val="tx1"/>
+    </dgm:txFillClrLst>
+    <dgm:txEffectClrLst/>
+  </dgm:styleLbl>
+  <dgm:styleLbl name="asst0">
+    <dgm:fillClrLst meth="repeat">
+      <a:schemeClr val="accent5"/>
+    </dgm:fillClrLst>
+    <dgm:linClrLst meth="repeat">
+      <a:schemeClr val="lt1">
+        <a:shade val="80000"/>
       </a:schemeClr>
     </dgm:linClrLst>
     <dgm:effectClrLst/>
@@ -1217,15 +1303,13 @@
     <dgm:txFillClrLst/>
     <dgm:txEffectClrLst/>
   </dgm:styleLbl>
-  <dgm:styleLbl name="fgSibTrans2D1">
+  <dgm:styleLbl name="asst1">
     <dgm:fillClrLst meth="repeat">
-      <a:schemeClr val="accent1">
-        <a:tint val="60000"/>
-      </a:schemeClr>
+      <a:schemeClr val="accent6"/>
     </dgm:fillClrLst>
     <dgm:linClrLst meth="repeat">
-      <a:schemeClr val="accent1">
-        <a:tint val="60000"/>
+      <a:schemeClr val="lt1">
+        <a:shade val="80000"/>
       </a:schemeClr>
     </dgm:linClrLst>
     <dgm:effectClrLst/>
@@ -1233,25 +1317,129 @@
     <dgm:txFillClrLst/>
     <dgm:txEffectClrLst/>
   </dgm:styleLbl>
-  <dgm:styleLbl name="bgSibTrans2D1">
-    <dgm:fillClrLst meth="repeat">
-      <a:schemeClr val="accent1">
-        <a:tint val="60000"/>
-      </a:schemeClr>
+  <dgm:styleLbl name="asst2">
+    <dgm:fillClrLst>
+      <a:schemeClr val="accent1"/>
     </dgm:fillClrLst>
     <dgm:linClrLst meth="repeat">
-      <a:schemeClr val="accent1">
-        <a:tint val="60000"/>
-      </a:schemeClr>
+      <a:schemeClr val="lt1"/>
     </dgm:linClrLst>
     <dgm:effectClrLst/>
     <dgm:txLinClrLst/>
     <dgm:txFillClrLst/>
     <dgm:txEffectClrLst/>
   </dgm:styleLbl>
-  <dgm:styleLbl name="sibTrans1D1">
+  <dgm:styleLbl name="asst3">
+    <dgm:fillClrLst>
+      <a:schemeClr val="accent2"/>
+    </dgm:fillClrLst>
+    <dgm:linClrLst meth="repeat">
+      <a:schemeClr val="lt1"/>
+    </dgm:linClrLst>
+    <dgm:effectClrLst/>
+    <dgm:txLinClrLst/>
+    <dgm:txFillClrLst/>
+    <dgm:txEffectClrLst/>
+  </dgm:styleLbl>
+  <dgm:styleLbl name="asst4">
+    <dgm:fillClrLst>
+      <a:schemeClr val="accent3"/>
+    </dgm:fillClrLst>
+    <dgm:linClrLst meth="repeat">
+      <a:schemeClr val="lt1"/>
+    </dgm:linClrLst>
+    <dgm:effectClrLst/>
+    <dgm:txLinClrLst/>
+    <dgm:txFillClrLst/>
+    <dgm:txEffectClrLst/>
+  </dgm:styleLbl>
+  <dgm:styleLbl name="parChTrans2D1">
+    <dgm:fillClrLst meth="repeat">
+      <a:schemeClr val="accent5"/>
+    </dgm:fillClrLst>
+    <dgm:linClrLst meth="repeat">
+      <a:schemeClr val="lt1"/>
+    </dgm:linClrLst>
+    <dgm:effectClrLst/>
+    <dgm:txLinClrLst/>
+    <dgm:txFillClrLst meth="repeat">
+      <a:schemeClr val="lt1"/>
+    </dgm:txFillClrLst>
+    <dgm:txEffectClrLst/>
+  </dgm:styleLbl>
+  <dgm:styleLbl name="parChTrans2D2">
+    <dgm:fillClrLst meth="repeat">
+      <a:schemeClr val="accent6"/>
+    </dgm:fillClrLst>
+    <dgm:linClrLst meth="repeat">
+      <a:schemeClr val="lt1"/>
+    </dgm:linClrLst>
+    <dgm:effectClrLst/>
+    <dgm:txLinClrLst/>
+    <dgm:txFillClrLst/>
+    <dgm:txEffectClrLst/>
+  </dgm:styleLbl>
+  <dgm:styleLbl name="parChTrans2D3">
+    <dgm:fillClrLst meth="repeat">
+      <a:schemeClr val="accent6"/>
+    </dgm:fillClrLst>
+    <dgm:linClrLst meth="repeat">
+      <a:schemeClr val="lt1"/>
+    </dgm:linClrLst>
+    <dgm:effectClrLst/>
+    <dgm:txLinClrLst/>
+    <dgm:txFillClrLst/>
+    <dgm:txEffectClrLst/>
+  </dgm:styleLbl>
+  <dgm:styleLbl name="parChTrans2D4">
     <dgm:fillClrLst meth="repeat">
       <a:schemeClr val="accent1"/>
+    </dgm:fillClrLst>
+    <dgm:linClrLst meth="repeat">
+      <a:schemeClr val="lt1"/>
+    </dgm:linClrLst>
+    <dgm:effectClrLst/>
+    <dgm:txLinClrLst/>
+    <dgm:txFillClrLst meth="repeat">
+      <a:schemeClr val="lt1"/>
+    </dgm:txFillClrLst>
+    <dgm:txEffectClrLst/>
+  </dgm:styleLbl>
+  <dgm:styleLbl name="parChTrans1D1">
+    <dgm:fillClrLst meth="repeat">
+      <a:schemeClr val="accent5"/>
+    </dgm:fillClrLst>
+    <dgm:linClrLst meth="repeat">
+      <a:schemeClr val="accent5"/>
+    </dgm:linClrLst>
+    <dgm:effectClrLst/>
+    <dgm:txLinClrLst/>
+    <dgm:txFillClrLst meth="repeat">
+      <a:schemeClr val="tx1"/>
+    </dgm:txFillClrLst>
+    <dgm:txEffectClrLst/>
+  </dgm:styleLbl>
+  <dgm:styleLbl name="parChTrans1D2">
+    <dgm:fillClrLst meth="repeat">
+      <a:schemeClr val="accent6">
+        <a:tint val="90000"/>
+      </a:schemeClr>
+    </dgm:fillClrLst>
+    <dgm:linClrLst meth="repeat">
+      <a:schemeClr val="accent6"/>
+    </dgm:linClrLst>
+    <dgm:effectClrLst/>
+    <dgm:txLinClrLst/>
+    <dgm:txFillClrLst meth="repeat">
+      <a:schemeClr val="tx1"/>
+    </dgm:txFillClrLst>
+    <dgm:txEffectClrLst/>
+  </dgm:styleLbl>
+  <dgm:styleLbl name="parChTrans1D3">
+    <dgm:fillClrLst meth="repeat">
+      <a:schemeClr val="accent6">
+        <a:tint val="70000"/>
+      </a:schemeClr>
     </dgm:fillClrLst>
     <dgm:linClrLst meth="repeat">
       <a:schemeClr val="accent1"/>
@@ -1263,14 +1451,14 @@
     </dgm:txFillClrLst>
     <dgm:txEffectClrLst/>
   </dgm:styleLbl>
-  <dgm:styleLbl name="callout">
+  <dgm:styleLbl name="parChTrans1D4">
     <dgm:fillClrLst meth="repeat">
-      <a:schemeClr val="accent1"/>
+      <a:schemeClr val="accent6">
+        <a:tint val="50000"/>
+      </a:schemeClr>
     </dgm:fillClrLst>
     <dgm:linClrLst meth="repeat">
-      <a:schemeClr val="accent1">
-        <a:tint val="50000"/>
-      </a:schemeClr>
+      <a:schemeClr val="accent2"/>
     </dgm:linClrLst>
     <dgm:effectClrLst/>
     <dgm:txLinClrLst/>
@@ -1279,197 +1467,258 @@
     </dgm:txFillClrLst>
     <dgm:txEffectClrLst/>
   </dgm:styleLbl>
-  <dgm:styleLbl name="asst0">
-    <dgm:fillClrLst meth="repeat">
-      <a:schemeClr val="accent1"/>
-    </dgm:fillClrLst>
-    <dgm:linClrLst meth="repeat">
-      <a:schemeClr val="lt1"/>
-    </dgm:linClrLst>
-    <dgm:effectClrLst/>
-    <dgm:txLinClrLst/>
-    <dgm:txFillClrLst/>
-    <dgm:txEffectClrLst/>
-  </dgm:styleLbl>
-  <dgm:styleLbl name="asst1">
-    <dgm:fillClrLst meth="repeat">
-      <a:schemeClr val="accent1"/>
-    </dgm:fillClrLst>
-    <dgm:linClrLst meth="repeat">
-      <a:schemeClr val="lt1"/>
-    </dgm:linClrLst>
-    <dgm:effectClrLst/>
-    <dgm:txLinClrLst/>
-    <dgm:txFillClrLst/>
-    <dgm:txEffectClrLst/>
-  </dgm:styleLbl>
-  <dgm:styleLbl name="asst2">
-    <dgm:fillClrLst meth="repeat">
-      <a:schemeClr val="accent1"/>
-    </dgm:fillClrLst>
-    <dgm:linClrLst meth="repeat">
-      <a:schemeClr val="lt1"/>
-    </dgm:linClrLst>
-    <dgm:effectClrLst/>
-    <dgm:txLinClrLst/>
-    <dgm:txFillClrLst/>
-    <dgm:txEffectClrLst/>
-  </dgm:styleLbl>
-  <dgm:styleLbl name="asst3">
-    <dgm:fillClrLst meth="repeat">
-      <a:schemeClr val="accent1"/>
-    </dgm:fillClrLst>
-    <dgm:linClrLst meth="repeat">
-      <a:schemeClr val="lt1"/>
-    </dgm:linClrLst>
-    <dgm:effectClrLst/>
-    <dgm:txLinClrLst/>
-    <dgm:txFillClrLst/>
-    <dgm:txEffectClrLst/>
-  </dgm:styleLbl>
-  <dgm:styleLbl name="asst4">
-    <dgm:fillClrLst meth="repeat">
-      <a:schemeClr val="accent1"/>
-    </dgm:fillClrLst>
-    <dgm:linClrLst meth="repeat">
-      <a:schemeClr val="lt1"/>
-    </dgm:linClrLst>
-    <dgm:effectClrLst/>
-    <dgm:txLinClrLst/>
-    <dgm:txFillClrLst/>
-    <dgm:txEffectClrLst/>
-  </dgm:styleLbl>
-  <dgm:styleLbl name="parChTrans2D1">
-    <dgm:fillClrLst meth="repeat">
-      <a:schemeClr val="accent1">
-        <a:tint val="60000"/>
-      </a:schemeClr>
-    </dgm:fillClrLst>
-    <dgm:linClrLst meth="repeat">
-      <a:schemeClr val="accent1">
-        <a:tint val="60000"/>
-      </a:schemeClr>
-    </dgm:linClrLst>
-    <dgm:effectClrLst/>
-    <dgm:txLinClrLst/>
-    <dgm:txFillClrLst meth="repeat">
-      <a:schemeClr val="lt1"/>
-    </dgm:txFillClrLst>
-    <dgm:txEffectClrLst/>
-  </dgm:styleLbl>
-  <dgm:styleLbl name="parChTrans2D2">
-    <dgm:fillClrLst meth="repeat">
-      <a:schemeClr val="accent1"/>
-    </dgm:fillClrLst>
-    <dgm:linClrLst meth="repeat">
-      <a:schemeClr val="accent1"/>
-    </dgm:linClrLst>
-    <dgm:effectClrLst/>
-    <dgm:txLinClrLst/>
-    <dgm:txFillClrLst meth="repeat">
-      <a:schemeClr val="lt1"/>
-    </dgm:txFillClrLst>
-    <dgm:txEffectClrLst/>
-  </dgm:styleLbl>
-  <dgm:styleLbl name="parChTrans2D3">
-    <dgm:fillClrLst meth="repeat">
-      <a:schemeClr val="accent1"/>
-    </dgm:fillClrLst>
-    <dgm:linClrLst meth="repeat">
-      <a:schemeClr val="accent1"/>
-    </dgm:linClrLst>
-    <dgm:effectClrLst/>
-    <dgm:txLinClrLst/>
-    <dgm:txFillClrLst meth="repeat">
-      <a:schemeClr val="lt1"/>
-    </dgm:txFillClrLst>
-    <dgm:txEffectClrLst/>
-  </dgm:styleLbl>
-  <dgm:styleLbl name="parChTrans2D4">
-    <dgm:fillClrLst meth="repeat">
-      <a:schemeClr val="accent1"/>
-    </dgm:fillClrLst>
-    <dgm:linClrLst meth="repeat">
-      <a:schemeClr val="accent1"/>
-    </dgm:linClrLst>
-    <dgm:effectClrLst/>
-    <dgm:txLinClrLst/>
-    <dgm:txFillClrLst meth="repeat">
-      <a:schemeClr val="lt1"/>
-    </dgm:txFillClrLst>
-    <dgm:txEffectClrLst/>
-  </dgm:styleLbl>
-  <dgm:styleLbl name="parChTrans1D1">
-    <dgm:fillClrLst meth="repeat">
-      <a:schemeClr val="accent1"/>
-    </dgm:fillClrLst>
-    <dgm:linClrLst meth="repeat">
-      <a:schemeClr val="accent1">
-        <a:shade val="60000"/>
-      </a:schemeClr>
-    </dgm:linClrLst>
-    <dgm:effectClrLst/>
-    <dgm:txLinClrLst/>
-    <dgm:txFillClrLst meth="repeat">
-      <a:schemeClr val="tx1"/>
-    </dgm:txFillClrLst>
-    <dgm:txEffectClrLst/>
-  </dgm:styleLbl>
-  <dgm:styleLbl name="parChTrans1D2">
-    <dgm:fillClrLst meth="repeat">
-      <a:schemeClr val="accent1"/>
-    </dgm:fillClrLst>
-    <dgm:linClrLst meth="repeat">
-      <a:schemeClr val="accent1">
-        <a:shade val="60000"/>
-      </a:schemeClr>
-    </dgm:linClrLst>
-    <dgm:effectClrLst/>
-    <dgm:txLinClrLst/>
-    <dgm:txFillClrLst meth="repeat">
-      <a:schemeClr val="tx1"/>
-    </dgm:txFillClrLst>
-    <dgm:txEffectClrLst/>
-  </dgm:styleLbl>
-  <dgm:styleLbl name="parChTrans1D3">
-    <dgm:fillClrLst meth="repeat">
-      <a:schemeClr val="accent1"/>
-    </dgm:fillClrLst>
-    <dgm:linClrLst meth="repeat">
-      <a:schemeClr val="accent1">
-        <a:shade val="80000"/>
-      </a:schemeClr>
-    </dgm:linClrLst>
-    <dgm:effectClrLst/>
-    <dgm:txLinClrLst/>
-    <dgm:txFillClrLst meth="repeat">
-      <a:schemeClr val="tx1"/>
-    </dgm:txFillClrLst>
-    <dgm:txEffectClrLst/>
-  </dgm:styleLbl>
-  <dgm:styleLbl name="parChTrans1D4">
-    <dgm:fillClrLst meth="repeat">
-      <a:schemeClr val="accent1"/>
-    </dgm:fillClrLst>
-    <dgm:linClrLst meth="repeat">
-      <a:schemeClr val="accent1">
-        <a:shade val="80000"/>
-      </a:schemeClr>
-    </dgm:linClrLst>
-    <dgm:effectClrLst/>
-    <dgm:txLinClrLst/>
-    <dgm:txFillClrLst meth="repeat">
-      <a:schemeClr val="tx1"/>
-    </dgm:txFillClrLst>
-    <dgm:txEffectClrLst/>
-  </dgm:styleLbl>
   <dgm:styleLbl name="fgAcc1">
     <dgm:fillClrLst meth="repeat">
       <a:schemeClr val="lt1">
         <a:alpha val="90000"/>
       </a:schemeClr>
     </dgm:fillClrLst>
+    <dgm:linClrLst>
+      <a:schemeClr val="accent5"/>
+      <a:schemeClr val="accent6"/>
+    </dgm:linClrLst>
+    <dgm:effectClrLst/>
+    <dgm:txLinClrLst/>
+    <dgm:txFillClrLst meth="repeat">
+      <a:schemeClr val="dk1"/>
+    </dgm:txFillClrLst>
+    <dgm:txEffectClrLst/>
+  </dgm:styleLbl>
+  <dgm:styleLbl name="conFgAcc1">
+    <dgm:fillClrLst meth="repeat">
+      <a:schemeClr val="lt1">
+        <a:alpha val="90000"/>
+      </a:schemeClr>
+    </dgm:fillClrLst>
+    <dgm:linClrLst>
+      <a:schemeClr val="accent5"/>
+      <a:schemeClr val="accent6"/>
+    </dgm:linClrLst>
+    <dgm:effectClrLst/>
+    <dgm:txLinClrLst/>
+    <dgm:txFillClrLst meth="repeat">
+      <a:schemeClr val="dk1"/>
+    </dgm:txFillClrLst>
+    <dgm:txEffectClrLst/>
+  </dgm:styleLbl>
+  <dgm:styleLbl name="alignAcc1">
+    <dgm:fillClrLst meth="repeat">
+      <a:schemeClr val="lt1">
+        <a:alpha val="90000"/>
+      </a:schemeClr>
+    </dgm:fillClrLst>
+    <dgm:linClrLst>
+      <a:schemeClr val="accent5"/>
+      <a:schemeClr val="accent6"/>
+    </dgm:linClrLst>
+    <dgm:effectClrLst/>
+    <dgm:txLinClrLst/>
+    <dgm:txFillClrLst meth="repeat">
+      <a:schemeClr val="dk1"/>
+    </dgm:txFillClrLst>
+    <dgm:txEffectClrLst/>
+  </dgm:styleLbl>
+  <dgm:styleLbl name="trAlignAcc1">
+    <dgm:fillClrLst meth="repeat">
+      <a:schemeClr val="lt1">
+        <a:alpha val="40000"/>
+      </a:schemeClr>
+    </dgm:fillClrLst>
     <dgm:linClrLst meth="repeat">
+      <a:schemeClr val="accent5"/>
+    </dgm:linClrLst>
+    <dgm:effectClrLst/>
+    <dgm:txLinClrLst/>
+    <dgm:txFillClrLst meth="repeat">
+      <a:schemeClr val="dk1"/>
+    </dgm:txFillClrLst>
+    <dgm:txEffectClrLst/>
+  </dgm:styleLbl>
+  <dgm:styleLbl name="bgAcc1">
+    <dgm:fillClrLst meth="repeat">
+      <a:schemeClr val="lt1">
+        <a:alpha val="90000"/>
+      </a:schemeClr>
+    </dgm:fillClrLst>
+    <dgm:linClrLst>
+      <a:schemeClr val="accent5"/>
+      <a:schemeClr val="accent6"/>
+    </dgm:linClrLst>
+    <dgm:effectClrLst/>
+    <dgm:txLinClrLst/>
+    <dgm:txFillClrLst meth="repeat">
+      <a:schemeClr val="dk1"/>
+    </dgm:txFillClrLst>
+    <dgm:txEffectClrLst/>
+  </dgm:styleLbl>
+  <dgm:styleLbl name="solidFgAcc1">
+    <dgm:fillClrLst meth="repeat">
+      <a:schemeClr val="lt1"/>
+    </dgm:fillClrLst>
+    <dgm:linClrLst>
+      <a:schemeClr val="accent5"/>
+      <a:schemeClr val="accent6"/>
+    </dgm:linClrLst>
+    <dgm:effectClrLst/>
+    <dgm:txLinClrLst/>
+    <dgm:txFillClrLst meth="repeat">
+      <a:schemeClr val="dk1"/>
+    </dgm:txFillClrLst>
+    <dgm:txEffectClrLst/>
+  </dgm:styleLbl>
+  <dgm:styleLbl name="solidAlignAcc1">
+    <dgm:fillClrLst meth="repeat">
+      <a:schemeClr val="lt1"/>
+    </dgm:fillClrLst>
+    <dgm:linClrLst>
+      <a:schemeClr val="accent5"/>
+      <a:schemeClr val="accent6"/>
+    </dgm:linClrLst>
+    <dgm:effectClrLst/>
+    <dgm:txLinClrLst/>
+    <dgm:txFillClrLst meth="repeat">
+      <a:schemeClr val="dk1"/>
+    </dgm:txFillClrLst>
+    <dgm:txEffectClrLst/>
+  </dgm:styleLbl>
+  <dgm:styleLbl name="solidBgAcc1">
+    <dgm:fillClrLst meth="repeat">
+      <a:schemeClr val="lt1"/>
+    </dgm:fillClrLst>
+    <dgm:linClrLst>
+      <a:schemeClr val="accent5"/>
+      <a:schemeClr val="accent6"/>
+    </dgm:linClrLst>
+    <dgm:effectClrLst/>
+    <dgm:txLinClrLst/>
+    <dgm:txFillClrLst meth="repeat">
+      <a:schemeClr val="dk1"/>
+    </dgm:txFillClrLst>
+    <dgm:txEffectClrLst/>
+  </dgm:styleLbl>
+  <dgm:styleLbl name="fgAccFollowNode1">
+    <dgm:fillClrLst>
+      <a:schemeClr val="accent5">
+        <a:tint val="40000"/>
+        <a:alpha val="90000"/>
+      </a:schemeClr>
+      <a:schemeClr val="accent6">
+        <a:tint val="40000"/>
+        <a:alpha val="90000"/>
+      </a:schemeClr>
+    </dgm:fillClrLst>
+    <dgm:linClrLst>
+      <a:schemeClr val="accent5">
+        <a:tint val="40000"/>
+        <a:alpha val="90000"/>
+      </a:schemeClr>
+      <a:schemeClr val="accent5">
+        <a:tint val="40000"/>
+        <a:alpha val="90000"/>
+      </a:schemeClr>
+    </dgm:linClrLst>
+    <dgm:effectClrLst/>
+    <dgm:txLinClrLst/>
+    <dgm:txFillClrLst meth="repeat">
+      <a:schemeClr val="dk1"/>
+    </dgm:txFillClrLst>
+    <dgm:txEffectClrLst/>
+  </dgm:styleLbl>
+  <dgm:styleLbl name="alignAccFollowNode1">
+    <dgm:fillClrLst>
+      <a:schemeClr val="accent5">
+        <a:tint val="40000"/>
+        <a:alpha val="90000"/>
+      </a:schemeClr>
+      <a:schemeClr val="accent6">
+        <a:tint val="40000"/>
+        <a:alpha val="90000"/>
+      </a:schemeClr>
+    </dgm:fillClrLst>
+    <dgm:linClrLst>
+      <a:schemeClr val="accent5">
+        <a:tint val="40000"/>
+        <a:alpha val="90000"/>
+      </a:schemeClr>
+      <a:schemeClr val="accent6">
+        <a:tint val="40000"/>
+        <a:alpha val="90000"/>
+      </a:schemeClr>
+    </dgm:linClrLst>
+    <dgm:effectClrLst/>
+    <dgm:txLinClrLst/>
+    <dgm:txFillClrLst meth="repeat">
+      <a:schemeClr val="dk1"/>
+    </dgm:txFillClrLst>
+    <dgm:txEffectClrLst/>
+  </dgm:styleLbl>
+  <dgm:styleLbl name="bgAccFollowNode1">
+    <dgm:fillClrLst>
+      <a:schemeClr val="accent5">
+        <a:tint val="40000"/>
+        <a:alpha val="90000"/>
+      </a:schemeClr>
+      <a:schemeClr val="accent6">
+        <a:tint val="40000"/>
+        <a:alpha val="90000"/>
+      </a:schemeClr>
+    </dgm:fillClrLst>
+    <dgm:linClrLst>
+      <a:schemeClr val="accent5">
+        <a:tint val="40000"/>
+        <a:alpha val="90000"/>
+      </a:schemeClr>
+      <a:schemeClr val="accent6">
+        <a:tint val="40000"/>
+        <a:alpha val="90000"/>
+      </a:schemeClr>
+    </dgm:linClrLst>
+    <dgm:effectClrLst/>
+    <dgm:txLinClrLst/>
+    <dgm:txFillClrLst meth="repeat">
+      <a:schemeClr val="dk1"/>
+    </dgm:txFillClrLst>
+    <dgm:txEffectClrLst/>
+  </dgm:styleLbl>
+  <dgm:styleLbl name="fgAcc0">
+    <dgm:fillClrLst meth="repeat">
+      <a:schemeClr val="lt1">
+        <a:alpha val="90000"/>
+      </a:schemeClr>
+    </dgm:fillClrLst>
+    <dgm:linClrLst>
+      <a:schemeClr val="accent4"/>
+    </dgm:linClrLst>
+    <dgm:effectClrLst/>
+    <dgm:txLinClrLst/>
+    <dgm:txFillClrLst meth="repeat">
+      <a:schemeClr val="dk1"/>
+    </dgm:txFillClrLst>
+    <dgm:txEffectClrLst/>
+  </dgm:styleLbl>
+  <dgm:styleLbl name="fgAcc2">
+    <dgm:fillClrLst meth="repeat">
+      <a:schemeClr val="lt1">
+        <a:alpha val="90000"/>
+      </a:schemeClr>
+    </dgm:fillClrLst>
+    <dgm:linClrLst>
+      <a:schemeClr val="accent6"/>
+    </dgm:linClrLst>
+    <dgm:effectClrLst/>
+    <dgm:txLinClrLst/>
+    <dgm:txFillClrLst meth="repeat">
+      <a:schemeClr val="dk1"/>
+    </dgm:txFillClrLst>
+    <dgm:txEffectClrLst/>
+  </dgm:styleLbl>
+  <dgm:styleLbl name="fgAcc3">
+    <dgm:fillClrLst meth="repeat">
+      <a:schemeClr val="lt1">
+        <a:alpha val="90000"/>
+      </a:schemeClr>
+    </dgm:fillClrLst>
+    <dgm:linClrLst>
       <a:schemeClr val="accent1"/>
     </dgm:linClrLst>
     <dgm:effectClrLst/>
@@ -1479,14 +1728,14 @@
     </dgm:txFillClrLst>
     <dgm:txEffectClrLst/>
   </dgm:styleLbl>
-  <dgm:styleLbl name="conFgAcc1">
+  <dgm:styleLbl name="fgAcc4">
     <dgm:fillClrLst meth="repeat">
       <a:schemeClr val="lt1">
         <a:alpha val="90000"/>
       </a:schemeClr>
     </dgm:fillClrLst>
-    <dgm:linClrLst meth="repeat">
-      <a:schemeClr val="accent1"/>
+    <dgm:linClrLst>
+      <a:schemeClr val="accent2"/>
     </dgm:linClrLst>
     <dgm:effectClrLst/>
     <dgm:txLinClrLst/>
@@ -1495,14 +1744,14 @@
     </dgm:txFillClrLst>
     <dgm:txEffectClrLst/>
   </dgm:styleLbl>
-  <dgm:styleLbl name="alignAcc1">
+  <dgm:styleLbl name="bgShp">
     <dgm:fillClrLst meth="repeat">
-      <a:schemeClr val="lt1">
-        <a:alpha val="90000"/>
+      <a:schemeClr val="accent5">
+        <a:tint val="40000"/>
       </a:schemeClr>
     </dgm:fillClrLst>
     <dgm:linClrLst meth="repeat">
-      <a:schemeClr val="accent1"/>
+      <a:schemeClr val="dk1"/>
     </dgm:linClrLst>
     <dgm:effectClrLst/>
     <dgm:txLinClrLst/>
@@ -1511,228 +1760,14 @@
     </dgm:txFillClrLst>
     <dgm:txEffectClrLst/>
   </dgm:styleLbl>
-  <dgm:styleLbl name="trAlignAcc1">
+  <dgm:styleLbl name="dkBgShp">
     <dgm:fillClrLst meth="repeat">
-      <a:schemeClr val="lt1">
-        <a:alpha val="40000"/>
+      <a:schemeClr val="accent5">
+        <a:shade val="90000"/>
       </a:schemeClr>
     </dgm:fillClrLst>
     <dgm:linClrLst meth="repeat">
-      <a:schemeClr val="accent1"/>
-    </dgm:linClrLst>
-    <dgm:effectClrLst/>
-    <dgm:txLinClrLst/>
-    <dgm:txFillClrLst meth="repeat">
       <a:schemeClr val="dk1"/>
-    </dgm:txFillClrLst>
-    <dgm:txEffectClrLst/>
-  </dgm:styleLbl>
-  <dgm:styleLbl name="bgAcc1">
-    <dgm:fillClrLst meth="repeat">
-      <a:schemeClr val="lt1">
-        <a:alpha val="90000"/>
-      </a:schemeClr>
-    </dgm:fillClrLst>
-    <dgm:linClrLst meth="repeat">
-      <a:schemeClr val="accent1"/>
-    </dgm:linClrLst>
-    <dgm:effectClrLst/>
-    <dgm:txLinClrLst/>
-    <dgm:txFillClrLst meth="repeat">
-      <a:schemeClr val="dk1"/>
-    </dgm:txFillClrLst>
-    <dgm:txEffectClrLst/>
-  </dgm:styleLbl>
-  <dgm:styleLbl name="solidFgAcc1">
-    <dgm:fillClrLst meth="repeat">
-      <a:schemeClr val="lt1"/>
-    </dgm:fillClrLst>
-    <dgm:linClrLst meth="repeat">
-      <a:schemeClr val="accent1"/>
-    </dgm:linClrLst>
-    <dgm:effectClrLst/>
-    <dgm:txLinClrLst/>
-    <dgm:txFillClrLst meth="repeat">
-      <a:schemeClr val="dk1"/>
-    </dgm:txFillClrLst>
-    <dgm:txEffectClrLst/>
-  </dgm:styleLbl>
-  <dgm:styleLbl name="solidAlignAcc1">
-    <dgm:fillClrLst meth="repeat">
-      <a:schemeClr val="lt1"/>
-    </dgm:fillClrLst>
-    <dgm:linClrLst meth="repeat">
-      <a:schemeClr val="accent1"/>
-    </dgm:linClrLst>
-    <dgm:effectClrLst/>
-    <dgm:txLinClrLst/>
-    <dgm:txFillClrLst meth="repeat">
-      <a:schemeClr val="dk1"/>
-    </dgm:txFillClrLst>
-    <dgm:txEffectClrLst/>
-  </dgm:styleLbl>
-  <dgm:styleLbl name="solidBgAcc1">
-    <dgm:fillClrLst meth="repeat">
-      <a:schemeClr val="lt1"/>
-    </dgm:fillClrLst>
-    <dgm:linClrLst meth="repeat">
-      <a:schemeClr val="accent1"/>
-    </dgm:linClrLst>
-    <dgm:effectClrLst/>
-    <dgm:txLinClrLst/>
-    <dgm:txFillClrLst meth="repeat">
-      <a:schemeClr val="dk1"/>
-    </dgm:txFillClrLst>
-    <dgm:txEffectClrLst/>
-  </dgm:styleLbl>
-  <dgm:styleLbl name="fgAccFollowNode1">
-    <dgm:fillClrLst meth="repeat">
-      <a:schemeClr val="accent1">
-        <a:alpha val="90000"/>
-        <a:tint val="40000"/>
-      </a:schemeClr>
-    </dgm:fillClrLst>
-    <dgm:linClrLst meth="repeat">
-      <a:schemeClr val="accent1">
-        <a:alpha val="90000"/>
-        <a:tint val="40000"/>
-      </a:schemeClr>
-    </dgm:linClrLst>
-    <dgm:effectClrLst/>
-    <dgm:txLinClrLst/>
-    <dgm:txFillClrLst meth="repeat">
-      <a:schemeClr val="dk1"/>
-    </dgm:txFillClrLst>
-    <dgm:txEffectClrLst/>
-  </dgm:styleLbl>
-  <dgm:styleLbl name="alignAccFollowNode1">
-    <dgm:fillClrLst meth="repeat">
-      <a:schemeClr val="accent1">
-        <a:alpha val="90000"/>
-        <a:tint val="40000"/>
-      </a:schemeClr>
-    </dgm:fillClrLst>
-    <dgm:linClrLst meth="repeat">
-      <a:schemeClr val="accent1">
-        <a:alpha val="90000"/>
-        <a:tint val="40000"/>
-      </a:schemeClr>
-    </dgm:linClrLst>
-    <dgm:effectClrLst/>
-    <dgm:txLinClrLst/>
-    <dgm:txFillClrLst meth="repeat">
-      <a:schemeClr val="dk1"/>
-    </dgm:txFillClrLst>
-    <dgm:txEffectClrLst/>
-  </dgm:styleLbl>
-  <dgm:styleLbl name="bgAccFollowNode1">
-    <dgm:fillClrLst meth="repeat">
-      <a:schemeClr val="accent1">
-        <a:alpha val="90000"/>
-        <a:tint val="40000"/>
-      </a:schemeClr>
-    </dgm:fillClrLst>
-    <dgm:linClrLst meth="repeat">
-      <a:schemeClr val="accent1">
-        <a:alpha val="90000"/>
-        <a:tint val="40000"/>
-      </a:schemeClr>
-    </dgm:linClrLst>
-    <dgm:effectClrLst/>
-    <dgm:txLinClrLst/>
-    <dgm:txFillClrLst meth="repeat">
-      <a:schemeClr val="dk1"/>
-    </dgm:txFillClrLst>
-    <dgm:txEffectClrLst/>
-  </dgm:styleLbl>
-  <dgm:styleLbl name="fgAcc0">
-    <dgm:fillClrLst meth="repeat">
-      <a:schemeClr val="lt1">
-        <a:alpha val="90000"/>
-      </a:schemeClr>
-    </dgm:fillClrLst>
-    <dgm:linClrLst meth="repeat">
-      <a:schemeClr val="accent1"/>
-    </dgm:linClrLst>
-    <dgm:effectClrLst/>
-    <dgm:txLinClrLst/>
-    <dgm:txFillClrLst meth="repeat">
-      <a:schemeClr val="dk1"/>
-    </dgm:txFillClrLst>
-    <dgm:txEffectClrLst/>
-  </dgm:styleLbl>
-  <dgm:styleLbl name="fgAcc2">
-    <dgm:fillClrLst meth="repeat">
-      <a:schemeClr val="lt1">
-        <a:alpha val="90000"/>
-      </a:schemeClr>
-    </dgm:fillClrLst>
-    <dgm:linClrLst meth="repeat">
-      <a:schemeClr val="accent1"/>
-    </dgm:linClrLst>
-    <dgm:effectClrLst/>
-    <dgm:txLinClrLst/>
-    <dgm:txFillClrLst meth="repeat">
-      <a:schemeClr val="dk1"/>
-    </dgm:txFillClrLst>
-    <dgm:txEffectClrLst/>
-  </dgm:styleLbl>
-  <dgm:styleLbl name="fgAcc3">
-    <dgm:fillClrLst meth="repeat">
-      <a:schemeClr val="lt1">
-        <a:alpha val="90000"/>
-      </a:schemeClr>
-    </dgm:fillClrLst>
-    <dgm:linClrLst meth="repeat">
-      <a:schemeClr val="accent1"/>
-    </dgm:linClrLst>
-    <dgm:effectClrLst/>
-    <dgm:txLinClrLst/>
-    <dgm:txFillClrLst meth="repeat">
-      <a:schemeClr val="dk1"/>
-    </dgm:txFillClrLst>
-    <dgm:txEffectClrLst/>
-  </dgm:styleLbl>
-  <dgm:styleLbl name="fgAcc4">
-    <dgm:fillClrLst meth="repeat">
-      <a:schemeClr val="lt1">
-        <a:alpha val="90000"/>
-      </a:schemeClr>
-    </dgm:fillClrLst>
-    <dgm:linClrLst meth="repeat">
-      <a:schemeClr val="accent1"/>
-    </dgm:linClrLst>
-    <dgm:effectClrLst/>
-    <dgm:txLinClrLst/>
-    <dgm:txFillClrLst meth="repeat">
-      <a:schemeClr val="dk1"/>
-    </dgm:txFillClrLst>
-    <dgm:txEffectClrLst/>
-  </dgm:styleLbl>
-  <dgm:styleLbl name="bgShp">
-    <dgm:fillClrLst meth="repeat">
-      <a:schemeClr val="accent1">
-        <a:tint val="40000"/>
-      </a:schemeClr>
-    </dgm:fillClrLst>
-    <dgm:linClrLst meth="repeat">
-      <a:schemeClr val="accent1"/>
-    </dgm:linClrLst>
-    <dgm:effectClrLst/>
-    <dgm:txLinClrLst/>
-    <dgm:txFillClrLst meth="repeat">
-      <a:schemeClr val="dk1"/>
-    </dgm:txFillClrLst>
-    <dgm:txEffectClrLst/>
-  </dgm:styleLbl>
-  <dgm:styleLbl name="dkBgShp">
-    <dgm:fillClrLst meth="repeat">
-      <a:schemeClr val="accent1">
-        <a:shade val="80000"/>
-      </a:schemeClr>
-    </dgm:fillClrLst>
-    <dgm:linClrLst meth="repeat">
-      <a:schemeClr val="accent1"/>
     </dgm:linClrLst>
     <dgm:effectClrLst/>
     <dgm:txLinClrLst/>
@@ -1743,13 +1778,13 @@
   </dgm:styleLbl>
   <dgm:styleLbl name="trBgShp">
     <dgm:fillClrLst meth="repeat">
-      <a:schemeClr val="accent1">
+      <a:schemeClr val="accent5">
         <a:tint val="50000"/>
         <a:alpha val="40000"/>
       </a:schemeClr>
     </dgm:fillClrLst>
     <dgm:linClrLst meth="repeat">
-      <a:schemeClr val="accent1"/>
+      <a:schemeClr val="accent5"/>
     </dgm:linClrLst>
     <dgm:effectClrLst/>
     <dgm:txLinClrLst/>
@@ -1760,8 +1795,8 @@
   </dgm:styleLbl>
   <dgm:styleLbl name="fgShp">
     <dgm:fillClrLst meth="repeat">
-      <a:schemeClr val="accent1">
-        <a:tint val="60000"/>
+      <a:schemeClr val="accent5">
+        <a:tint val="40000"/>
       </a:schemeClr>
     </dgm:fillClrLst>
     <dgm:linClrLst meth="repeat">
@@ -3005,8 +3040,8 @@
   </dgm:ptLst>
   <dgm:cxnLst>
     <dgm:cxn modelId="{2B24550E-81B3-426F-BE48-6FA07DEB0006}" srcId="{A933ACAE-7780-4DF5-858C-D6AA07E0E593}" destId="{E603327F-15B3-4D48-A753-A9139F8B0D35}" srcOrd="2" destOrd="0" parTransId="{970FE23F-581A-49DB-AE37-3D6FB1C300F2}" sibTransId="{622E9EE8-5C74-4C09-B275-BD0BEB6D5C08}"/>
+    <dgm:cxn modelId="{6C2D9868-A5AB-4DE5-97F0-8847999668D7}" type="presOf" srcId="{E603327F-15B3-4D48-A753-A9139F8B0D35}" destId="{103DC83F-D0A3-48D7-AB6D-EDD100A7CAA4}" srcOrd="0" destOrd="0" presId="urn:microsoft.com/office/officeart/2018/2/layout/IconVerticalSolidList"/>
     <dgm:cxn modelId="{E207C44C-3845-411E-BF35-CFB0DC884139}" srcId="{A933ACAE-7780-4DF5-858C-D6AA07E0E593}" destId="{A5819F66-59C4-4704-A22F-419521284766}" srcOrd="1" destOrd="0" parTransId="{E7AA1A4E-B192-4BE4-A63C-129465BE8446}" sibTransId="{900063D9-3B12-47BF-B23D-971318CAB0A7}"/>
-    <dgm:cxn modelId="{6C2D9868-A5AB-4DE5-97F0-8847999668D7}" type="presOf" srcId="{E603327F-15B3-4D48-A753-A9139F8B0D35}" destId="{103DC83F-D0A3-48D7-AB6D-EDD100A7CAA4}" srcOrd="0" destOrd="0" presId="urn:microsoft.com/office/officeart/2018/2/layout/IconVerticalSolidList"/>
     <dgm:cxn modelId="{0874616F-2898-4294-B1AD-8CD6BCE2FE2C}" type="presOf" srcId="{A933ACAE-7780-4DF5-858C-D6AA07E0E593}" destId="{61A30870-CC18-475D-8026-243365D951DD}" srcOrd="0" destOrd="0" presId="urn:microsoft.com/office/officeart/2018/2/layout/IconVerticalSolidList"/>
     <dgm:cxn modelId="{63D7F87B-A8FD-44CD-A5F9-018A01A32536}" srcId="{A933ACAE-7780-4DF5-858C-D6AA07E0E593}" destId="{DBB65D89-528B-4284-9C42-FE3083DAC981}" srcOrd="0" destOrd="0" parTransId="{4EA7726A-B92A-43C8-9E91-0ECDB3585903}" sibTransId="{ED4C0813-4A38-4FF1-B48B-49E524FFD054}"/>
     <dgm:cxn modelId="{0A266E89-782C-457A-A8ED-71D9EBDEEC6C}" type="presOf" srcId="{DBB65D89-528B-4284-9C42-FE3083DAC981}" destId="{23DC7C18-DD0C-4A94-9C0D-E94F74E12519}" srcOrd="0" destOrd="0" presId="urn:microsoft.com/office/officeart/2018/2/layout/IconVerticalSolidList"/>
@@ -3033,7 +3068,7 @@
   <dgm:whole/>
   <dgm:extLst>
     <a:ext uri="http://schemas.microsoft.com/office/drawing/2008/diagram">
-      <dsp:dataModelExt xmlns:dsp="http://schemas.microsoft.com/office/drawing/2008/diagram" relId="rId6" minVer="http://schemas.openxmlformats.org/drawingml/2006/diagram"/>
+      <dsp:dataModelExt xmlns:dsp="http://schemas.microsoft.com/office/drawing/2008/diagram" relId="rId7" minVer="http://schemas.openxmlformats.org/drawingml/2006/diagram"/>
     </a:ext>
   </dgm:extLst>
 </dgm:dataModel>
@@ -3043,7 +3078,7 @@
 <dgm:dataModel xmlns:dgm="http://schemas.openxmlformats.org/drawingml/2006/diagram" xmlns:a="http://schemas.openxmlformats.org/drawingml/2006/main">
   <dgm:ptLst>
     <dgm:pt modelId="{A6B621F4-1CB3-4A38-806E-6C0EF11C685E}" type="doc">
-      <dgm:prSet loTypeId="urn:microsoft.com/office/officeart/2008/layout/LinedList" loCatId="list" qsTypeId="urn:microsoft.com/office/officeart/2005/8/quickstyle/simple1" qsCatId="simple" csTypeId="urn:microsoft.com/office/officeart/2005/8/colors/accent1_2" csCatId="accent1"/>
+      <dgm:prSet loTypeId="urn:microsoft.com/office/officeart/2005/8/layout/vList2" loCatId="list" qsTypeId="urn:microsoft.com/office/officeart/2005/8/quickstyle/simple1" qsCatId="simple" csTypeId="urn:microsoft.com/office/officeart/2005/8/colors/colorful5" csCatId="colorful" phldr="1"/>
       <dgm:spPr/>
       <dgm:t>
         <a:bodyPr/>
@@ -3061,7 +3096,7 @@
         <a:lstStyle/>
         <a:p>
           <a:r>
-            <a:rPr lang="en-US"/>
+            <a:rPr lang="en-US" dirty="0"/>
             <a:t>Up next: Windows App SDK 1.6</a:t>
           </a:r>
         </a:p>
@@ -3181,85 +3216,427 @@
         </a:p>
       </dgm:t>
     </dgm:pt>
-    <dgm:pt modelId="{847F8B11-872E-AE47-9CE4-167BE4BC9F7E}" type="pres">
-      <dgm:prSet presAssocID="{A6B621F4-1CB3-4A38-806E-6C0EF11C685E}" presName="vert0" presStyleCnt="0">
+    <dgm:pt modelId="{811C0B52-2A08-4327-AD76-D45F602ADC98}">
+      <dgm:prSet/>
+      <dgm:spPr/>
+      <dgm:t>
+        <a:bodyPr/>
+        <a:lstStyle/>
+        <a:p>
+          <a:r>
+            <a:rPr lang="en-US" dirty="0"/>
+            <a:t>Quality - Address top issues (controls and Windows App SDK installer)</a:t>
+          </a:r>
+        </a:p>
+      </dgm:t>
+    </dgm:pt>
+    <dgm:pt modelId="{C79EF54C-3433-4056-8B95-AEB2821DEA4D}" type="parTrans" cxnId="{90D66076-E5EF-4D1B-9387-CC5805EFDBC8}">
+      <dgm:prSet/>
+      <dgm:spPr/>
+      <dgm:t>
+        <a:bodyPr/>
+        <a:lstStyle/>
+        <a:p>
+          <a:endParaRPr lang="en-US"/>
+        </a:p>
+      </dgm:t>
+    </dgm:pt>
+    <dgm:pt modelId="{2891C27F-9060-4775-AFF5-D891B31AA9A7}" type="sibTrans" cxnId="{90D66076-E5EF-4D1B-9387-CC5805EFDBC8}">
+      <dgm:prSet/>
+      <dgm:spPr/>
+      <dgm:t>
+        <a:bodyPr/>
+        <a:lstStyle/>
+        <a:p>
+          <a:endParaRPr lang="en-US"/>
+        </a:p>
+      </dgm:t>
+    </dgm:pt>
+    <dgm:pt modelId="{F4C94C3A-3E70-45DF-9EED-33CC8B5D880E}">
+      <dgm:prSet/>
+      <dgm:spPr/>
+      <dgm:t>
+        <a:bodyPr/>
+        <a:lstStyle/>
+        <a:p>
+          <a:r>
+            <a:rPr lang="en-US" dirty="0"/>
+            <a:t>Performance</a:t>
+          </a:r>
+        </a:p>
+      </dgm:t>
+    </dgm:pt>
+    <dgm:pt modelId="{0D66A478-318F-4559-B813-125B60FC0777}" type="parTrans" cxnId="{D63CE6AF-4CBE-4A4A-BC21-67C6A2F7D345}">
+      <dgm:prSet/>
+      <dgm:spPr/>
+      <dgm:t>
+        <a:bodyPr/>
+        <a:lstStyle/>
+        <a:p>
+          <a:endParaRPr lang="en-US"/>
+        </a:p>
+      </dgm:t>
+    </dgm:pt>
+    <dgm:pt modelId="{3B706A9A-784E-41E8-AD4C-3AE07EDFA898}" type="sibTrans" cxnId="{D63CE6AF-4CBE-4A4A-BC21-67C6A2F7D345}">
+      <dgm:prSet/>
+      <dgm:spPr/>
+      <dgm:t>
+        <a:bodyPr/>
+        <a:lstStyle/>
+        <a:p>
+          <a:endParaRPr lang="en-US"/>
+        </a:p>
+      </dgm:t>
+    </dgm:pt>
+    <dgm:pt modelId="{4A8003FA-FE2D-40DD-9140-79042F59634A}">
+      <dgm:prSet/>
+      <dgm:spPr/>
+      <dgm:t>
+        <a:bodyPr/>
+        <a:lstStyle/>
+        <a:p>
+          <a:r>
+            <a:rPr lang="en-US" dirty="0"/>
+            <a:t>Improved </a:t>
+          </a:r>
+          <a:r>
+            <a:rPr lang="en-US" dirty="0" err="1"/>
+            <a:t>TitleBar</a:t>
+          </a:r>
+          <a:r>
+            <a:rPr lang="en-US" dirty="0"/>
+            <a:t> and tab dragging</a:t>
+          </a:r>
+        </a:p>
+      </dgm:t>
+    </dgm:pt>
+    <dgm:pt modelId="{03110B09-6457-4F4C-8770-60EF59BDDFF4}" type="parTrans" cxnId="{AC8E6334-8B6D-4FE1-BF9F-DFF3A7B131A0}">
+      <dgm:prSet/>
+      <dgm:spPr/>
+      <dgm:t>
+        <a:bodyPr/>
+        <a:lstStyle/>
+        <a:p>
+          <a:endParaRPr lang="en-US"/>
+        </a:p>
+      </dgm:t>
+    </dgm:pt>
+    <dgm:pt modelId="{2B791422-97C0-46C2-9DA9-744F5C86CB9C}" type="sibTrans" cxnId="{AC8E6334-8B6D-4FE1-BF9F-DFF3A7B131A0}">
+      <dgm:prSet/>
+      <dgm:spPr/>
+      <dgm:t>
+        <a:bodyPr/>
+        <a:lstStyle/>
+        <a:p>
+          <a:endParaRPr lang="en-US"/>
+        </a:p>
+      </dgm:t>
+    </dgm:pt>
+    <dgm:pt modelId="{0E1CF8A5-A4C0-4DFE-A6FA-20B8C50C4D8F}">
+      <dgm:prSet/>
+      <dgm:spPr/>
+      <dgm:t>
+        <a:bodyPr/>
+        <a:lstStyle/>
+        <a:p>
+          <a:r>
+            <a:rPr lang="en-US" dirty="0"/>
+            <a:t>IntelliSense and x:Bind improvements</a:t>
+          </a:r>
+        </a:p>
+      </dgm:t>
+    </dgm:pt>
+    <dgm:pt modelId="{6528BF6C-2D88-4456-B903-801A0026B28C}" type="parTrans" cxnId="{26CAF3A7-3C0B-4B97-B618-9A6709A0473F}">
+      <dgm:prSet/>
+      <dgm:spPr/>
+      <dgm:t>
+        <a:bodyPr/>
+        <a:lstStyle/>
+        <a:p>
+          <a:endParaRPr lang="en-US"/>
+        </a:p>
+      </dgm:t>
+    </dgm:pt>
+    <dgm:pt modelId="{6113F7E1-7E14-4FBB-A205-7C6C6ADF9282}" type="sibTrans" cxnId="{26CAF3A7-3C0B-4B97-B618-9A6709A0473F}">
+      <dgm:prSet/>
+      <dgm:spPr/>
+      <dgm:t>
+        <a:bodyPr/>
+        <a:lstStyle/>
+        <a:p>
+          <a:endParaRPr lang="en-US"/>
+        </a:p>
+      </dgm:t>
+    </dgm:pt>
+    <dgm:pt modelId="{5200F57D-1822-4986-B754-342BD97DC98F}">
+      <dgm:prSet/>
+      <dgm:spPr/>
+      <dgm:t>
+        <a:bodyPr/>
+        <a:lstStyle/>
+        <a:p>
+          <a:r>
+            <a:rPr lang="en-US" dirty="0"/>
+            <a:t>Continued work in 1.6, but release in 1.7+</a:t>
+          </a:r>
+        </a:p>
+      </dgm:t>
+    </dgm:pt>
+    <dgm:pt modelId="{A91CE92A-5D79-4EE7-BD8D-BD257B2B065B}" type="parTrans" cxnId="{2F4EAA6F-BF6A-4459-B693-6AC1BA8FF695}">
+      <dgm:prSet/>
+      <dgm:spPr/>
+      <dgm:t>
+        <a:bodyPr/>
+        <a:lstStyle/>
+        <a:p>
+          <a:endParaRPr lang="en-US"/>
+        </a:p>
+      </dgm:t>
+    </dgm:pt>
+    <dgm:pt modelId="{46526B07-030F-4AD8-9D7C-329675D7F0F9}" type="sibTrans" cxnId="{2F4EAA6F-BF6A-4459-B693-6AC1BA8FF695}">
+      <dgm:prSet/>
+      <dgm:spPr/>
+      <dgm:t>
+        <a:bodyPr/>
+        <a:lstStyle/>
+        <a:p>
+          <a:endParaRPr lang="en-US"/>
+        </a:p>
+      </dgm:t>
+    </dgm:pt>
+    <dgm:pt modelId="{BA269B1F-8AA7-40BF-BB5D-F7E53F2EA80D}">
+      <dgm:prSet/>
+      <dgm:spPr/>
+      <dgm:t>
+        <a:bodyPr/>
+        <a:lstStyle/>
+        <a:p>
+          <a:r>
+            <a:rPr lang="en-US" dirty="0" err="1"/>
+            <a:t>TableView</a:t>
+          </a:r>
+          <a:r>
+            <a:rPr lang="en-US" dirty="0"/>
+            <a:t>, inking controls, and cross-process Islands</a:t>
+          </a:r>
+        </a:p>
+      </dgm:t>
+    </dgm:pt>
+    <dgm:pt modelId="{E4B04BEB-7662-49CA-B608-5E382E133FF8}" type="parTrans" cxnId="{B79D5CD8-464D-4CE6-B013-4E96A9876C08}">
+      <dgm:prSet/>
+      <dgm:spPr/>
+      <dgm:t>
+        <a:bodyPr/>
+        <a:lstStyle/>
+        <a:p>
+          <a:endParaRPr lang="en-US"/>
+        </a:p>
+      </dgm:t>
+    </dgm:pt>
+    <dgm:pt modelId="{4FF46375-5515-4A15-B08C-92617686AB26}" type="sibTrans" cxnId="{B79D5CD8-464D-4CE6-B013-4E96A9876C08}">
+      <dgm:prSet/>
+      <dgm:spPr/>
+      <dgm:t>
+        <a:bodyPr/>
+        <a:lstStyle/>
+        <a:p>
+          <a:endParaRPr lang="en-US"/>
+        </a:p>
+      </dgm:t>
+    </dgm:pt>
+    <dgm:pt modelId="{EF73EB12-6A93-4F6D-BE4B-D244678E171A}">
+      <dgm:prSet/>
+      <dgm:spPr/>
+      <dgm:t>
+        <a:bodyPr/>
+        <a:lstStyle/>
+        <a:p>
+          <a:r>
+            <a:rPr lang="en-US" dirty="0"/>
+            <a:t>Smooth app resizing</a:t>
+          </a:r>
+        </a:p>
+      </dgm:t>
+    </dgm:pt>
+    <dgm:pt modelId="{167CD09A-EF19-4301-BB06-5B4233691BDE}" type="parTrans" cxnId="{C653E750-05F1-4C02-8924-B243DAFEA797}">
+      <dgm:prSet/>
+      <dgm:spPr/>
+      <dgm:t>
+        <a:bodyPr/>
+        <a:lstStyle/>
+        <a:p>
+          <a:endParaRPr lang="en-US"/>
+        </a:p>
+      </dgm:t>
+    </dgm:pt>
+    <dgm:pt modelId="{7DF1DCCA-2092-4EA4-82FD-4F1B010D766F}" type="sibTrans" cxnId="{C653E750-05F1-4C02-8924-B243DAFEA797}">
+      <dgm:prSet/>
+      <dgm:spPr/>
+      <dgm:t>
+        <a:bodyPr/>
+        <a:lstStyle/>
+        <a:p>
+          <a:endParaRPr lang="en-US"/>
+        </a:p>
+      </dgm:t>
+    </dgm:pt>
+    <dgm:pt modelId="{A253A4DA-CB27-4A49-A5DD-667DA2616790}">
+      <dgm:prSet/>
+      <dgm:spPr/>
+      <dgm:t>
+        <a:bodyPr/>
+        <a:lstStyle/>
+        <a:p>
+          <a:r>
+            <a:rPr lang="en-US" dirty="0"/>
+            <a:t>C# Native </a:t>
+          </a:r>
+          <a:r>
+            <a:rPr lang="en-US"/>
+            <a:t>AOT support</a:t>
+          </a:r>
+          <a:endParaRPr lang="en-US" dirty="0"/>
+        </a:p>
+      </dgm:t>
+    </dgm:pt>
+    <dgm:pt modelId="{70583D9D-7666-4375-B284-799E2E24E54C}" type="parTrans" cxnId="{2EEEC16C-8446-4EEF-923F-9E195B0829F7}">
+      <dgm:prSet/>
+      <dgm:spPr/>
+      <dgm:t>
+        <a:bodyPr/>
+        <a:lstStyle/>
+        <a:p>
+          <a:endParaRPr lang="en-US"/>
+        </a:p>
+      </dgm:t>
+    </dgm:pt>
+    <dgm:pt modelId="{8976510E-3400-4415-B8F0-6E2CCA8F0AEA}" type="sibTrans" cxnId="{2EEEC16C-8446-4EEF-923F-9E195B0829F7}">
+      <dgm:prSet/>
+      <dgm:spPr/>
+      <dgm:t>
+        <a:bodyPr/>
+        <a:lstStyle/>
+        <a:p>
+          <a:endParaRPr lang="en-US"/>
+        </a:p>
+      </dgm:t>
+    </dgm:pt>
+    <dgm:pt modelId="{F673AD63-71AD-4934-A86C-121E6B918FA0}">
+      <dgm:prSet/>
+      <dgm:spPr/>
+      <dgm:t>
+        <a:bodyPr/>
+        <a:lstStyle/>
+        <a:p>
+          <a:r>
+            <a:rPr lang="en-US" dirty="0"/>
+            <a:t>General perf improvements</a:t>
+          </a:r>
+        </a:p>
+      </dgm:t>
+    </dgm:pt>
+    <dgm:pt modelId="{028F30BA-7BFA-40B3-B3DF-C47548A4E973}" type="parTrans" cxnId="{D631BFBD-79AB-4A1B-9089-F0B22EB25BBE}">
+      <dgm:prSet/>
+      <dgm:spPr/>
+      <dgm:t>
+        <a:bodyPr/>
+        <a:lstStyle/>
+        <a:p>
+          <a:endParaRPr lang="en-US"/>
+        </a:p>
+      </dgm:t>
+    </dgm:pt>
+    <dgm:pt modelId="{C1700AEA-38B8-4555-8AE2-397020220160}" type="sibTrans" cxnId="{D631BFBD-79AB-4A1B-9089-F0B22EB25BBE}">
+      <dgm:prSet/>
+      <dgm:spPr/>
+      <dgm:t>
+        <a:bodyPr/>
+        <a:lstStyle/>
+        <a:p>
+          <a:endParaRPr lang="en-US"/>
+        </a:p>
+      </dgm:t>
+    </dgm:pt>
+    <dgm:pt modelId="{E8036105-7427-4AEC-A09C-7A715734ECC3}" type="pres">
+      <dgm:prSet presAssocID="{A6B621F4-1CB3-4A38-806E-6C0EF11C685E}" presName="linear" presStyleCnt="0">
         <dgm:presLayoutVars>
-          <dgm:dir/>
-          <dgm:animOne val="branch"/>
           <dgm:animLvl val="lvl"/>
+          <dgm:resizeHandles val="exact"/>
         </dgm:presLayoutVars>
       </dgm:prSet>
       <dgm:spPr/>
     </dgm:pt>
-    <dgm:pt modelId="{17390688-FD26-E148-88E8-ED7E5C802039}" type="pres">
-      <dgm:prSet presAssocID="{2004030C-332B-4072-AFE1-22E865A21FF9}" presName="thickLine" presStyleLbl="alignNode1" presStyleIdx="0" presStyleCnt="3"/>
+    <dgm:pt modelId="{21A12690-DA36-452B-9960-5AA31672A6D5}" type="pres">
+      <dgm:prSet presAssocID="{2004030C-332B-4072-AFE1-22E865A21FF9}" presName="parentText" presStyleLbl="node1" presStyleIdx="0" presStyleCnt="3">
+        <dgm:presLayoutVars>
+          <dgm:chMax val="0"/>
+          <dgm:bulletEnabled val="1"/>
+        </dgm:presLayoutVars>
+      </dgm:prSet>
       <dgm:spPr/>
     </dgm:pt>
-    <dgm:pt modelId="{C02F166D-6FFE-274A-88A4-2A3EBD317A61}" type="pres">
-      <dgm:prSet presAssocID="{2004030C-332B-4072-AFE1-22E865A21FF9}" presName="horz1" presStyleCnt="0"/>
+    <dgm:pt modelId="{10088698-C6FC-4465-A958-32E43273EA05}" type="pres">
+      <dgm:prSet presAssocID="{2004030C-332B-4072-AFE1-22E865A21FF9}" presName="childText" presStyleLbl="revTx" presStyleIdx="0" presStyleCnt="1">
+        <dgm:presLayoutVars>
+          <dgm:bulletEnabled val="1"/>
+        </dgm:presLayoutVars>
+      </dgm:prSet>
       <dgm:spPr/>
     </dgm:pt>
-    <dgm:pt modelId="{CFB79062-EF56-5F4B-9FCD-D5540355276B}" type="pres">
-      <dgm:prSet presAssocID="{2004030C-332B-4072-AFE1-22E865A21FF9}" presName="tx1" presStyleLbl="revTx" presStyleIdx="0" presStyleCnt="3"/>
+    <dgm:pt modelId="{080DD3DD-C325-46D2-94F5-8D18732AA821}" type="pres">
+      <dgm:prSet presAssocID="{828584FC-0DD2-428B-A303-21FB1DBEBBB8}" presName="parentText" presStyleLbl="node1" presStyleIdx="1" presStyleCnt="3">
+        <dgm:presLayoutVars>
+          <dgm:chMax val="0"/>
+          <dgm:bulletEnabled val="1"/>
+        </dgm:presLayoutVars>
+      </dgm:prSet>
       <dgm:spPr/>
     </dgm:pt>
-    <dgm:pt modelId="{EA7FA467-FC7C-944B-B2EC-934033113680}" type="pres">
-      <dgm:prSet presAssocID="{2004030C-332B-4072-AFE1-22E865A21FF9}" presName="vert1" presStyleCnt="0"/>
+    <dgm:pt modelId="{61E529B3-822F-4965-903F-950F6ADFBF0E}" type="pres">
+      <dgm:prSet presAssocID="{2B4FCE66-8E93-4BE1-9C77-7005A1682A3D}" presName="spacer" presStyleCnt="0"/>
       <dgm:spPr/>
     </dgm:pt>
-    <dgm:pt modelId="{31A7B2DA-C760-0B42-B566-4CD46CB3E304}" type="pres">
-      <dgm:prSet presAssocID="{828584FC-0DD2-428B-A303-21FB1DBEBBB8}" presName="thickLine" presStyleLbl="alignNode1" presStyleIdx="1" presStyleCnt="3"/>
-      <dgm:spPr/>
-    </dgm:pt>
-    <dgm:pt modelId="{9319C105-B463-5540-9956-4415887A0401}" type="pres">
-      <dgm:prSet presAssocID="{828584FC-0DD2-428B-A303-21FB1DBEBBB8}" presName="horz1" presStyleCnt="0"/>
-      <dgm:spPr/>
-    </dgm:pt>
-    <dgm:pt modelId="{17D90343-566C-E642-9F2B-C46BA74883C3}" type="pres">
-      <dgm:prSet presAssocID="{828584FC-0DD2-428B-A303-21FB1DBEBBB8}" presName="tx1" presStyleLbl="revTx" presStyleIdx="1" presStyleCnt="3"/>
-      <dgm:spPr/>
-    </dgm:pt>
-    <dgm:pt modelId="{64568B9C-DBED-354B-A70B-DC0E4CDCEF53}" type="pres">
-      <dgm:prSet presAssocID="{828584FC-0DD2-428B-A303-21FB1DBEBBB8}" presName="vert1" presStyleCnt="0"/>
-      <dgm:spPr/>
-    </dgm:pt>
-    <dgm:pt modelId="{475BBA90-5DF3-4C43-9D96-A4022BD4CAE9}" type="pres">
-      <dgm:prSet presAssocID="{21DAA279-68CC-4BFC-9FFC-60956DB38B95}" presName="thickLine" presStyleLbl="alignNode1" presStyleIdx="2" presStyleCnt="3"/>
-      <dgm:spPr/>
-    </dgm:pt>
-    <dgm:pt modelId="{48C0DBF9-BF24-CD4F-870A-8957935BB8AA}" type="pres">
-      <dgm:prSet presAssocID="{21DAA279-68CC-4BFC-9FFC-60956DB38B95}" presName="horz1" presStyleCnt="0"/>
-      <dgm:spPr/>
-    </dgm:pt>
-    <dgm:pt modelId="{0A35448F-9BC4-1F42-9F3A-0B4121D5D726}" type="pres">
-      <dgm:prSet presAssocID="{21DAA279-68CC-4BFC-9FFC-60956DB38B95}" presName="tx1" presStyleLbl="revTx" presStyleIdx="2" presStyleCnt="3"/>
-      <dgm:spPr/>
-    </dgm:pt>
-    <dgm:pt modelId="{1A8F3DBE-EF2F-7345-95EE-BB871F0AA131}" type="pres">
-      <dgm:prSet presAssocID="{21DAA279-68CC-4BFC-9FFC-60956DB38B95}" presName="vert1" presStyleCnt="0"/>
+    <dgm:pt modelId="{BFFDD1B2-ED31-4779-97B3-01E417A0EE2F}" type="pres">
+      <dgm:prSet presAssocID="{21DAA279-68CC-4BFC-9FFC-60956DB38B95}" presName="parentText" presStyleLbl="node1" presStyleIdx="2" presStyleCnt="3">
+        <dgm:presLayoutVars>
+          <dgm:chMax val="0"/>
+          <dgm:bulletEnabled val="1"/>
+        </dgm:presLayoutVars>
+      </dgm:prSet>
       <dgm:spPr/>
     </dgm:pt>
   </dgm:ptLst>
   <dgm:cxnLst>
-    <dgm:cxn modelId="{CFA4301B-AC4E-584D-AB43-38A8B0B80E37}" type="presOf" srcId="{A6B621F4-1CB3-4A38-806E-6C0EF11C685E}" destId="{847F8B11-872E-AE47-9CE4-167BE4BC9F7E}" srcOrd="0" destOrd="0" presId="urn:microsoft.com/office/officeart/2008/layout/LinedList"/>
-    <dgm:cxn modelId="{89412658-38B9-2148-B33A-8CB047A0E77A}" type="presOf" srcId="{2004030C-332B-4072-AFE1-22E865A21FF9}" destId="{CFB79062-EF56-5F4B-9FCD-D5540355276B}" srcOrd="0" destOrd="0" presId="urn:microsoft.com/office/officeart/2008/layout/LinedList"/>
+    <dgm:cxn modelId="{306B8F21-3584-4B67-89D1-9B683AA646FF}" type="presOf" srcId="{BA269B1F-8AA7-40BF-BB5D-F7E53F2EA80D}" destId="{10088698-C6FC-4465-A958-32E43273EA05}" srcOrd="0" destOrd="7" presId="urn:microsoft.com/office/officeart/2005/8/layout/vList2"/>
+    <dgm:cxn modelId="{DFDA5528-5934-4DD9-AB50-F778973AD1FA}" type="presOf" srcId="{EF73EB12-6A93-4F6D-BE4B-D244678E171A}" destId="{10088698-C6FC-4465-A958-32E43273EA05}" srcOrd="0" destOrd="8" presId="urn:microsoft.com/office/officeart/2005/8/layout/vList2"/>
+    <dgm:cxn modelId="{AC8E6334-8B6D-4FE1-BF9F-DFF3A7B131A0}" srcId="{2004030C-332B-4072-AFE1-22E865A21FF9}" destId="{4A8003FA-FE2D-40DD-9140-79042F59634A}" srcOrd="2" destOrd="0" parTransId="{03110B09-6457-4F4C-8770-60EF59BDDFF4}" sibTransId="{2B791422-97C0-46C2-9DA9-744F5C86CB9C}"/>
+    <dgm:cxn modelId="{44635460-5BAE-4B15-B326-6C6A7EE6532F}" type="presOf" srcId="{A253A4DA-CB27-4A49-A5DD-667DA2616790}" destId="{10088698-C6FC-4465-A958-32E43273EA05}" srcOrd="0" destOrd="2" presId="urn:microsoft.com/office/officeart/2005/8/layout/vList2"/>
+    <dgm:cxn modelId="{2EEEC16C-8446-4EEF-923F-9E195B0829F7}" srcId="{F4C94C3A-3E70-45DF-9EED-33CC8B5D880E}" destId="{A253A4DA-CB27-4A49-A5DD-667DA2616790}" srcOrd="0" destOrd="0" parTransId="{70583D9D-7666-4375-B284-799E2E24E54C}" sibTransId="{8976510E-3400-4415-B8F0-6E2CCA8F0AEA}"/>
+    <dgm:cxn modelId="{2F4EAA6F-BF6A-4459-B693-6AC1BA8FF695}" srcId="{2004030C-332B-4072-AFE1-22E865A21FF9}" destId="{5200F57D-1822-4986-B754-342BD97DC98F}" srcOrd="4" destOrd="0" parTransId="{A91CE92A-5D79-4EE7-BD8D-BD257B2B065B}" sibTransId="{46526B07-030F-4AD8-9D7C-329675D7F0F9}"/>
+    <dgm:cxn modelId="{C653E750-05F1-4C02-8924-B243DAFEA797}" srcId="{5200F57D-1822-4986-B754-342BD97DC98F}" destId="{EF73EB12-6A93-4F6D-BE4B-D244678E171A}" srcOrd="1" destOrd="0" parTransId="{167CD09A-EF19-4301-BB06-5B4233691BDE}" sibTransId="{7DF1DCCA-2092-4EA4-82FD-4F1B010D766F}"/>
+    <dgm:cxn modelId="{E2F81455-43C9-4995-AA3C-43DD9D81186E}" type="presOf" srcId="{4A8003FA-FE2D-40DD-9140-79042F59634A}" destId="{10088698-C6FC-4465-A958-32E43273EA05}" srcOrd="0" destOrd="4" presId="urn:microsoft.com/office/officeart/2005/8/layout/vList2"/>
+    <dgm:cxn modelId="{90D66076-E5EF-4D1B-9387-CC5805EFDBC8}" srcId="{2004030C-332B-4072-AFE1-22E865A21FF9}" destId="{811C0B52-2A08-4327-AD76-D45F602ADC98}" srcOrd="0" destOrd="0" parTransId="{C79EF54C-3433-4056-8B95-AEB2821DEA4D}" sibTransId="{2891C27F-9060-4775-AFF5-D891B31AA9A7}"/>
     <dgm:cxn modelId="{310FA379-9390-4B05-B319-8D6186712055}" srcId="{A6B621F4-1CB3-4A38-806E-6C0EF11C685E}" destId="{2004030C-332B-4072-AFE1-22E865A21FF9}" srcOrd="0" destOrd="0" parTransId="{E3888E9E-84A6-4D2D-BC97-85E6DC9366CE}" sibTransId="{7F482F4D-60F1-47A9-B984-CEAF1529164F}"/>
+    <dgm:cxn modelId="{5B24DD8B-9B2D-4DBA-9D13-3B97AABC5846}" type="presOf" srcId="{828584FC-0DD2-428B-A303-21FB1DBEBBB8}" destId="{080DD3DD-C325-46D2-94F5-8D18732AA821}" srcOrd="0" destOrd="0" presId="urn:microsoft.com/office/officeart/2005/8/layout/vList2"/>
+    <dgm:cxn modelId="{F8BECF8F-A398-4ADE-9512-0CD9139ECFB7}" type="presOf" srcId="{811C0B52-2A08-4327-AD76-D45F602ADC98}" destId="{10088698-C6FC-4465-A958-32E43273EA05}" srcOrd="0" destOrd="0" presId="urn:microsoft.com/office/officeart/2005/8/layout/vList2"/>
+    <dgm:cxn modelId="{B20873A0-3156-49F5-8720-8478C2F797BF}" type="presOf" srcId="{0E1CF8A5-A4C0-4DFE-A6FA-20B8C50C4D8F}" destId="{10088698-C6FC-4465-A958-32E43273EA05}" srcOrd="0" destOrd="5" presId="urn:microsoft.com/office/officeart/2005/8/layout/vList2"/>
+    <dgm:cxn modelId="{26CAF3A7-3C0B-4B97-B618-9A6709A0473F}" srcId="{2004030C-332B-4072-AFE1-22E865A21FF9}" destId="{0E1CF8A5-A4C0-4DFE-A6FA-20B8C50C4D8F}" srcOrd="3" destOrd="0" parTransId="{6528BF6C-2D88-4456-B903-801A0026B28C}" sibTransId="{6113F7E1-7E14-4FBB-A205-7C6C6ADF9282}"/>
+    <dgm:cxn modelId="{D63CE6AF-4CBE-4A4A-BC21-67C6A2F7D345}" srcId="{2004030C-332B-4072-AFE1-22E865A21FF9}" destId="{F4C94C3A-3E70-45DF-9EED-33CC8B5D880E}" srcOrd="1" destOrd="0" parTransId="{0D66A478-318F-4559-B813-125B60FC0777}" sibTransId="{3B706A9A-784E-41E8-AD4C-3AE07EDFA898}"/>
+    <dgm:cxn modelId="{D631BFBD-79AB-4A1B-9089-F0B22EB25BBE}" srcId="{F4C94C3A-3E70-45DF-9EED-33CC8B5D880E}" destId="{F673AD63-71AD-4934-A86C-121E6B918FA0}" srcOrd="1" destOrd="0" parTransId="{028F30BA-7BFA-40B3-B3DF-C47548A4E973}" sibTransId="{C1700AEA-38B8-4555-8AE2-397020220160}"/>
+    <dgm:cxn modelId="{B19A75CE-8CCF-4294-8112-1B1D9368C6BE}" type="presOf" srcId="{A6B621F4-1CB3-4A38-806E-6C0EF11C685E}" destId="{E8036105-7427-4AEC-A09C-7A715734ECC3}" srcOrd="0" destOrd="0" presId="urn:microsoft.com/office/officeart/2005/8/layout/vList2"/>
     <dgm:cxn modelId="{5FE963D1-79B1-4A80-BDB9-F3F4AAF1AE77}" srcId="{A6B621F4-1CB3-4A38-806E-6C0EF11C685E}" destId="{21DAA279-68CC-4BFC-9FFC-60956DB38B95}" srcOrd="2" destOrd="0" parTransId="{B9CFB572-DA12-4322-BE93-4839838635D9}" sibTransId="{877D17CD-95A3-49D6-BF80-8B4B2F693A0C}"/>
-    <dgm:cxn modelId="{F43C19E7-5E42-7F42-B215-DEFE14905AB3}" type="presOf" srcId="{21DAA279-68CC-4BFC-9FFC-60956DB38B95}" destId="{0A35448F-9BC4-1F42-9F3A-0B4121D5D726}" srcOrd="0" destOrd="0" presId="urn:microsoft.com/office/officeart/2008/layout/LinedList"/>
-    <dgm:cxn modelId="{AE285CF5-CD2D-ED41-93E2-C79148189C5D}" type="presOf" srcId="{828584FC-0DD2-428B-A303-21FB1DBEBBB8}" destId="{17D90343-566C-E642-9F2B-C46BA74883C3}" srcOrd="0" destOrd="0" presId="urn:microsoft.com/office/officeart/2008/layout/LinedList"/>
+    <dgm:cxn modelId="{B79D5CD8-464D-4CE6-B013-4E96A9876C08}" srcId="{5200F57D-1822-4986-B754-342BD97DC98F}" destId="{BA269B1F-8AA7-40BF-BB5D-F7E53F2EA80D}" srcOrd="0" destOrd="0" parTransId="{E4B04BEB-7662-49CA-B608-5E382E133FF8}" sibTransId="{4FF46375-5515-4A15-B08C-92617686AB26}"/>
+    <dgm:cxn modelId="{D53806DD-8B81-4C8B-8A11-7CB922CD94DD}" type="presOf" srcId="{5200F57D-1822-4986-B754-342BD97DC98F}" destId="{10088698-C6FC-4465-A958-32E43273EA05}" srcOrd="0" destOrd="6" presId="urn:microsoft.com/office/officeart/2005/8/layout/vList2"/>
+    <dgm:cxn modelId="{DDF165E3-9778-4359-80DB-C0C8CC3E5264}" type="presOf" srcId="{F4C94C3A-3E70-45DF-9EED-33CC8B5D880E}" destId="{10088698-C6FC-4465-A958-32E43273EA05}" srcOrd="0" destOrd="1" presId="urn:microsoft.com/office/officeart/2005/8/layout/vList2"/>
+    <dgm:cxn modelId="{6EEE57EB-7E7F-43D0-8D48-607FC7F64C2D}" type="presOf" srcId="{F673AD63-71AD-4934-A86C-121E6B918FA0}" destId="{10088698-C6FC-4465-A958-32E43273EA05}" srcOrd="0" destOrd="3" presId="urn:microsoft.com/office/officeart/2005/8/layout/vList2"/>
+    <dgm:cxn modelId="{F8D6D7EF-E7CE-4D90-8645-13A875AA782B}" type="presOf" srcId="{2004030C-332B-4072-AFE1-22E865A21FF9}" destId="{21A12690-DA36-452B-9960-5AA31672A6D5}" srcOrd="0" destOrd="0" presId="urn:microsoft.com/office/officeart/2005/8/layout/vList2"/>
+    <dgm:cxn modelId="{EE3A0BF2-6B0C-4484-95F7-D9556F720FE5}" type="presOf" srcId="{21DAA279-68CC-4BFC-9FFC-60956DB38B95}" destId="{BFFDD1B2-ED31-4779-97B3-01E417A0EE2F}" srcOrd="0" destOrd="0" presId="urn:microsoft.com/office/officeart/2005/8/layout/vList2"/>
     <dgm:cxn modelId="{4A0DD8FD-49F9-49C9-8B7F-B013A8007769}" srcId="{A6B621F4-1CB3-4A38-806E-6C0EF11C685E}" destId="{828584FC-0DD2-428B-A303-21FB1DBEBBB8}" srcOrd="1" destOrd="0" parTransId="{AD49C757-38D4-44C2-8233-3801DBA519EE}" sibTransId="{2B4FCE66-8E93-4BE1-9C77-7005A1682A3D}"/>
-    <dgm:cxn modelId="{236C4B05-FCA8-E449-926D-11A45B58A50D}" type="presParOf" srcId="{847F8B11-872E-AE47-9CE4-167BE4BC9F7E}" destId="{17390688-FD26-E148-88E8-ED7E5C802039}" srcOrd="0" destOrd="0" presId="urn:microsoft.com/office/officeart/2008/layout/LinedList"/>
-    <dgm:cxn modelId="{C1AE3C05-2D52-0E4E-824F-374D9C0FDE62}" type="presParOf" srcId="{847F8B11-872E-AE47-9CE4-167BE4BC9F7E}" destId="{C02F166D-6FFE-274A-88A4-2A3EBD317A61}" srcOrd="1" destOrd="0" presId="urn:microsoft.com/office/officeart/2008/layout/LinedList"/>
-    <dgm:cxn modelId="{BF9092A8-30A0-2049-A0A3-01173ADEA4AF}" type="presParOf" srcId="{C02F166D-6FFE-274A-88A4-2A3EBD317A61}" destId="{CFB79062-EF56-5F4B-9FCD-D5540355276B}" srcOrd="0" destOrd="0" presId="urn:microsoft.com/office/officeart/2008/layout/LinedList"/>
-    <dgm:cxn modelId="{9E55FC21-0078-D340-9574-AAAB76A890C2}" type="presParOf" srcId="{C02F166D-6FFE-274A-88A4-2A3EBD317A61}" destId="{EA7FA467-FC7C-944B-B2EC-934033113680}" srcOrd="1" destOrd="0" presId="urn:microsoft.com/office/officeart/2008/layout/LinedList"/>
-    <dgm:cxn modelId="{D47ED209-FEF4-B34C-9A7E-1D684F78D176}" type="presParOf" srcId="{847F8B11-872E-AE47-9CE4-167BE4BC9F7E}" destId="{31A7B2DA-C760-0B42-B566-4CD46CB3E304}" srcOrd="2" destOrd="0" presId="urn:microsoft.com/office/officeart/2008/layout/LinedList"/>
-    <dgm:cxn modelId="{54624F59-29C2-4F4D-978C-033C4AD42D2E}" type="presParOf" srcId="{847F8B11-872E-AE47-9CE4-167BE4BC9F7E}" destId="{9319C105-B463-5540-9956-4415887A0401}" srcOrd="3" destOrd="0" presId="urn:microsoft.com/office/officeart/2008/layout/LinedList"/>
-    <dgm:cxn modelId="{DEC51AFA-0F4F-604E-B11C-F9DAC4D3D6E2}" type="presParOf" srcId="{9319C105-B463-5540-9956-4415887A0401}" destId="{17D90343-566C-E642-9F2B-C46BA74883C3}" srcOrd="0" destOrd="0" presId="urn:microsoft.com/office/officeart/2008/layout/LinedList"/>
-    <dgm:cxn modelId="{5EA2525B-ACC7-474D-9F5A-83D520E4D7BF}" type="presParOf" srcId="{9319C105-B463-5540-9956-4415887A0401}" destId="{64568B9C-DBED-354B-A70B-DC0E4CDCEF53}" srcOrd="1" destOrd="0" presId="urn:microsoft.com/office/officeart/2008/layout/LinedList"/>
-    <dgm:cxn modelId="{2F6BDF20-E1B9-0947-A9DC-99A380F310CB}" type="presParOf" srcId="{847F8B11-872E-AE47-9CE4-167BE4BC9F7E}" destId="{475BBA90-5DF3-4C43-9D96-A4022BD4CAE9}" srcOrd="4" destOrd="0" presId="urn:microsoft.com/office/officeart/2008/layout/LinedList"/>
-    <dgm:cxn modelId="{A1C65E00-2E72-FC4D-A3FF-5AF6E9F86DAD}" type="presParOf" srcId="{847F8B11-872E-AE47-9CE4-167BE4BC9F7E}" destId="{48C0DBF9-BF24-CD4F-870A-8957935BB8AA}" srcOrd="5" destOrd="0" presId="urn:microsoft.com/office/officeart/2008/layout/LinedList"/>
-    <dgm:cxn modelId="{6E9193E0-63B2-4B47-869C-4E7F2CD88C2E}" type="presParOf" srcId="{48C0DBF9-BF24-CD4F-870A-8957935BB8AA}" destId="{0A35448F-9BC4-1F42-9F3A-0B4121D5D726}" srcOrd="0" destOrd="0" presId="urn:microsoft.com/office/officeart/2008/layout/LinedList"/>
-    <dgm:cxn modelId="{2784CCD9-B308-DD49-8334-A28452FAF22C}" type="presParOf" srcId="{48C0DBF9-BF24-CD4F-870A-8957935BB8AA}" destId="{1A8F3DBE-EF2F-7345-95EE-BB871F0AA131}" srcOrd="1" destOrd="0" presId="urn:microsoft.com/office/officeart/2008/layout/LinedList"/>
+    <dgm:cxn modelId="{E355CC90-6C45-480D-BD13-A1701FBA29F2}" type="presParOf" srcId="{E8036105-7427-4AEC-A09C-7A715734ECC3}" destId="{21A12690-DA36-452B-9960-5AA31672A6D5}" srcOrd="0" destOrd="0" presId="urn:microsoft.com/office/officeart/2005/8/layout/vList2"/>
+    <dgm:cxn modelId="{AAD55691-A60D-4DAD-9AC9-1F155FAC92C0}" type="presParOf" srcId="{E8036105-7427-4AEC-A09C-7A715734ECC3}" destId="{10088698-C6FC-4465-A958-32E43273EA05}" srcOrd="1" destOrd="0" presId="urn:microsoft.com/office/officeart/2005/8/layout/vList2"/>
+    <dgm:cxn modelId="{05E9738D-3C67-47A8-9AB5-E944177C2F00}" type="presParOf" srcId="{E8036105-7427-4AEC-A09C-7A715734ECC3}" destId="{080DD3DD-C325-46D2-94F5-8D18732AA821}" srcOrd="2" destOrd="0" presId="urn:microsoft.com/office/officeart/2005/8/layout/vList2"/>
+    <dgm:cxn modelId="{5E227042-056C-452D-92B5-3C389C31AF2A}" type="presParOf" srcId="{E8036105-7427-4AEC-A09C-7A715734ECC3}" destId="{61E529B3-822F-4965-903F-950F6ADFBF0E}" srcOrd="3" destOrd="0" presId="urn:microsoft.com/office/officeart/2005/8/layout/vList2"/>
+    <dgm:cxn modelId="{12CADAC9-C104-425C-B312-0E401464D3EE}" type="presParOf" srcId="{E8036105-7427-4AEC-A09C-7A715734ECC3}" destId="{BFFDD1B2-ED31-4779-97B3-01E417A0EE2F}" srcOrd="4" destOrd="0" presId="urn:microsoft.com/office/officeart/2005/8/layout/vList2"/>
   </dgm:cxnLst>
   <dgm:bg/>
   <dgm:whole/>
@@ -4000,21 +4377,21 @@
       <dsp:cNvGrpSpPr/>
     </dsp:nvGrpSpPr>
     <dsp:grpSpPr/>
-    <dsp:sp modelId="{17390688-FD26-E148-88E8-ED7E5C802039}">
+    <dsp:sp modelId="{21A12690-DA36-452B-9960-5AA31672A6D5}">
       <dsp:nvSpPr>
         <dsp:cNvPr id="0" name=""/>
         <dsp:cNvSpPr/>
       </dsp:nvSpPr>
       <dsp:spPr>
         <a:xfrm>
-          <a:off x="0" y="2500"/>
-          <a:ext cx="7315200" cy="0"/>
+          <a:off x="0" y="364622"/>
+          <a:ext cx="7728267" cy="715052"/>
         </a:xfrm>
-        <a:prstGeom prst="line">
+        <a:prstGeom prst="roundRect">
           <a:avLst/>
         </a:prstGeom>
         <a:solidFill>
-          <a:schemeClr val="accent1">
+          <a:schemeClr val="accent5">
             <a:hueOff val="0"/>
             <a:satOff val="0"/>
             <a:lumOff val="0"/>
@@ -4023,7 +4400,7 @@
         </a:solidFill>
         <a:ln w="10795" cap="flat" cmpd="sng" algn="ctr">
           <a:solidFill>
-            <a:schemeClr val="accent1">
+            <a:schemeClr val="lt1">
               <a:hueOff val="0"/>
               <a:satOff val="0"/>
               <a:lumOff val="0"/>
@@ -4048,16 +4425,44 @@
           <a:schemeClr val="lt1"/>
         </a:fontRef>
       </dsp:style>
+      <dsp:txBody>
+        <a:bodyPr spcFirstLastPara="0" vert="horz" wrap="square" lIns="68580" tIns="68580" rIns="68580" bIns="68580" numCol="1" spcCol="1270" anchor="ctr" anchorCtr="0">
+          <a:noAutofit/>
+        </a:bodyPr>
+        <a:lstStyle/>
+        <a:p>
+          <a:pPr marL="0" lvl="0" indent="0" algn="l" defTabSz="800100">
+            <a:lnSpc>
+              <a:spcPct val="90000"/>
+            </a:lnSpc>
+            <a:spcBef>
+              <a:spcPct val="0"/>
+            </a:spcBef>
+            <a:spcAft>
+              <a:spcPct val="35000"/>
+            </a:spcAft>
+            <a:buNone/>
+          </a:pPr>
+          <a:r>
+            <a:rPr lang="en-US" sz="1800" kern="1200" dirty="0"/>
+            <a:t>Up next: Windows App SDK 1.6</a:t>
+          </a:r>
+        </a:p>
+      </dsp:txBody>
+      <dsp:txXfrm>
+        <a:off x="34906" y="399528"/>
+        <a:ext cx="7658455" cy="645240"/>
+      </dsp:txXfrm>
     </dsp:sp>
-    <dsp:sp modelId="{CFB79062-EF56-5F4B-9FCD-D5540355276B}">
+    <dsp:sp modelId="{10088698-C6FC-4465-A958-32E43273EA05}">
       <dsp:nvSpPr>
         <dsp:cNvPr id="0" name=""/>
         <dsp:cNvSpPr/>
       </dsp:nvSpPr>
       <dsp:spPr>
         <a:xfrm>
-          <a:off x="0" y="2500"/>
-          <a:ext cx="7315200" cy="1705213"/>
+          <a:off x="0" y="1079675"/>
+          <a:ext cx="7728267" cy="2161080"/>
         </a:xfrm>
         <a:prstGeom prst="rect">
           <a:avLst/>
@@ -4081,12 +4486,12 @@
         <a:fontRef idx="minor"/>
       </dsp:style>
       <dsp:txBody>
-        <a:bodyPr spcFirstLastPara="0" vert="horz" wrap="square" lIns="64770" tIns="64770" rIns="64770" bIns="64770" numCol="1" spcCol="1270" anchor="t" anchorCtr="0">
+        <a:bodyPr spcFirstLastPara="0" vert="horz" wrap="square" lIns="245372" tIns="22860" rIns="128016" bIns="22860" numCol="1" spcCol="1270" anchor="t" anchorCtr="0">
           <a:noAutofit/>
         </a:bodyPr>
         <a:lstStyle/>
         <a:p>
-          <a:pPr marL="0" lvl="0" indent="0" algn="l" defTabSz="755650">
+          <a:pPr marL="114300" lvl="1" indent="-114300" algn="l" defTabSz="622300">
             <a:lnSpc>
               <a:spcPct val="90000"/>
             </a:lnSpc>
@@ -4094,45 +4499,206 @@
               <a:spcPct val="0"/>
             </a:spcBef>
             <a:spcAft>
-              <a:spcPct val="35000"/>
+              <a:spcPct val="20000"/>
             </a:spcAft>
-            <a:buNone/>
+            <a:buChar char="•"/>
           </a:pPr>
           <a:r>
-            <a:rPr lang="en-US" sz="1700" kern="1200"/>
-            <a:t>Up next: Windows App SDK 1.6</a:t>
+            <a:rPr lang="en-US" sz="1400" kern="1200" dirty="0"/>
+            <a:t>Quality - Address top issues (controls and Windows App SDK installer)</a:t>
+          </a:r>
+        </a:p>
+        <a:p>
+          <a:pPr marL="114300" lvl="1" indent="-114300" algn="l" defTabSz="622300">
+            <a:lnSpc>
+              <a:spcPct val="90000"/>
+            </a:lnSpc>
+            <a:spcBef>
+              <a:spcPct val="0"/>
+            </a:spcBef>
+            <a:spcAft>
+              <a:spcPct val="20000"/>
+            </a:spcAft>
+            <a:buChar char="•"/>
+          </a:pPr>
+          <a:r>
+            <a:rPr lang="en-US" sz="1400" kern="1200" dirty="0"/>
+            <a:t>Performance</a:t>
+          </a:r>
+        </a:p>
+        <a:p>
+          <a:pPr marL="228600" lvl="2" indent="-114300" algn="l" defTabSz="622300">
+            <a:lnSpc>
+              <a:spcPct val="90000"/>
+            </a:lnSpc>
+            <a:spcBef>
+              <a:spcPct val="0"/>
+            </a:spcBef>
+            <a:spcAft>
+              <a:spcPct val="20000"/>
+            </a:spcAft>
+            <a:buChar char="•"/>
+          </a:pPr>
+          <a:r>
+            <a:rPr lang="en-US" sz="1400" kern="1200" dirty="0"/>
+            <a:t>C# Native </a:t>
+          </a:r>
+          <a:r>
+            <a:rPr lang="en-US" sz="1400" kern="1200"/>
+            <a:t>AOT support</a:t>
+          </a:r>
+          <a:endParaRPr lang="en-US" sz="1400" kern="1200" dirty="0"/>
+        </a:p>
+        <a:p>
+          <a:pPr marL="228600" lvl="2" indent="-114300" algn="l" defTabSz="622300">
+            <a:lnSpc>
+              <a:spcPct val="90000"/>
+            </a:lnSpc>
+            <a:spcBef>
+              <a:spcPct val="0"/>
+            </a:spcBef>
+            <a:spcAft>
+              <a:spcPct val="20000"/>
+            </a:spcAft>
+            <a:buChar char="•"/>
+          </a:pPr>
+          <a:r>
+            <a:rPr lang="en-US" sz="1400" kern="1200" dirty="0"/>
+            <a:t>General perf improvements</a:t>
+          </a:r>
+        </a:p>
+        <a:p>
+          <a:pPr marL="114300" lvl="1" indent="-114300" algn="l" defTabSz="622300">
+            <a:lnSpc>
+              <a:spcPct val="90000"/>
+            </a:lnSpc>
+            <a:spcBef>
+              <a:spcPct val="0"/>
+            </a:spcBef>
+            <a:spcAft>
+              <a:spcPct val="20000"/>
+            </a:spcAft>
+            <a:buChar char="•"/>
+          </a:pPr>
+          <a:r>
+            <a:rPr lang="en-US" sz="1400" kern="1200" dirty="0"/>
+            <a:t>Improved </a:t>
+          </a:r>
+          <a:r>
+            <a:rPr lang="en-US" sz="1400" kern="1200" dirty="0" err="1"/>
+            <a:t>TitleBar</a:t>
+          </a:r>
+          <a:r>
+            <a:rPr lang="en-US" sz="1400" kern="1200" dirty="0"/>
+            <a:t> and tab dragging</a:t>
+          </a:r>
+        </a:p>
+        <a:p>
+          <a:pPr marL="114300" lvl="1" indent="-114300" algn="l" defTabSz="622300">
+            <a:lnSpc>
+              <a:spcPct val="90000"/>
+            </a:lnSpc>
+            <a:spcBef>
+              <a:spcPct val="0"/>
+            </a:spcBef>
+            <a:spcAft>
+              <a:spcPct val="20000"/>
+            </a:spcAft>
+            <a:buChar char="•"/>
+          </a:pPr>
+          <a:r>
+            <a:rPr lang="en-US" sz="1400" kern="1200" dirty="0"/>
+            <a:t>IntelliSense and x:Bind improvements</a:t>
+          </a:r>
+        </a:p>
+        <a:p>
+          <a:pPr marL="114300" lvl="1" indent="-114300" algn="l" defTabSz="622300">
+            <a:lnSpc>
+              <a:spcPct val="90000"/>
+            </a:lnSpc>
+            <a:spcBef>
+              <a:spcPct val="0"/>
+            </a:spcBef>
+            <a:spcAft>
+              <a:spcPct val="20000"/>
+            </a:spcAft>
+            <a:buChar char="•"/>
+          </a:pPr>
+          <a:r>
+            <a:rPr lang="en-US" sz="1400" kern="1200" dirty="0"/>
+            <a:t>Continued work in 1.6, but release in 1.7+</a:t>
+          </a:r>
+        </a:p>
+        <a:p>
+          <a:pPr marL="228600" lvl="2" indent="-114300" algn="l" defTabSz="622300">
+            <a:lnSpc>
+              <a:spcPct val="90000"/>
+            </a:lnSpc>
+            <a:spcBef>
+              <a:spcPct val="0"/>
+            </a:spcBef>
+            <a:spcAft>
+              <a:spcPct val="20000"/>
+            </a:spcAft>
+            <a:buChar char="•"/>
+          </a:pPr>
+          <a:r>
+            <a:rPr lang="en-US" sz="1400" kern="1200" dirty="0" err="1"/>
+            <a:t>TableView</a:t>
+          </a:r>
+          <a:r>
+            <a:rPr lang="en-US" sz="1400" kern="1200" dirty="0"/>
+            <a:t>, inking controls, and cross-process Islands</a:t>
+          </a:r>
+        </a:p>
+        <a:p>
+          <a:pPr marL="228600" lvl="2" indent="-114300" algn="l" defTabSz="622300">
+            <a:lnSpc>
+              <a:spcPct val="90000"/>
+            </a:lnSpc>
+            <a:spcBef>
+              <a:spcPct val="0"/>
+            </a:spcBef>
+            <a:spcAft>
+              <a:spcPct val="20000"/>
+            </a:spcAft>
+            <a:buChar char="•"/>
+          </a:pPr>
+          <a:r>
+            <a:rPr lang="en-US" sz="1400" kern="1200" dirty="0"/>
+            <a:t>Smooth app resizing</a:t>
           </a:r>
         </a:p>
       </dsp:txBody>
       <dsp:txXfrm>
-        <a:off x="0" y="2500"/>
-        <a:ext cx="7315200" cy="1705213"/>
+        <a:off x="0" y="1079675"/>
+        <a:ext cx="7728267" cy="2161080"/>
       </dsp:txXfrm>
     </dsp:sp>
-    <dsp:sp modelId="{31A7B2DA-C760-0B42-B566-4CD46CB3E304}">
+    <dsp:sp modelId="{080DD3DD-C325-46D2-94F5-8D18732AA821}">
       <dsp:nvSpPr>
         <dsp:cNvPr id="0" name=""/>
         <dsp:cNvSpPr/>
       </dsp:nvSpPr>
       <dsp:spPr>
         <a:xfrm>
-          <a:off x="0" y="1707713"/>
-          <a:ext cx="7315200" cy="0"/>
+          <a:off x="0" y="3240755"/>
+          <a:ext cx="7728267" cy="715052"/>
         </a:xfrm>
-        <a:prstGeom prst="line">
+        <a:prstGeom prst="roundRect">
           <a:avLst/>
         </a:prstGeom>
         <a:solidFill>
-          <a:schemeClr val="accent1">
-            <a:hueOff val="0"/>
-            <a:satOff val="0"/>
-            <a:lumOff val="0"/>
+          <a:schemeClr val="accent5">
+            <a:hueOff val="5589159"/>
+            <a:satOff val="-4817"/>
+            <a:lumOff val="6373"/>
             <a:alphaOff val="0"/>
           </a:schemeClr>
         </a:solidFill>
         <a:ln w="10795" cap="flat" cmpd="sng" algn="ctr">
           <a:solidFill>
-            <a:schemeClr val="accent1">
+            <a:schemeClr val="lt1">
               <a:hueOff val="0"/>
               <a:satOff val="0"/>
               <a:lumOff val="0"/>
@@ -4157,45 +4723,13 @@
           <a:schemeClr val="lt1"/>
         </a:fontRef>
       </dsp:style>
-    </dsp:sp>
-    <dsp:sp modelId="{17D90343-566C-E642-9F2B-C46BA74883C3}">
-      <dsp:nvSpPr>
-        <dsp:cNvPr id="0" name=""/>
-        <dsp:cNvSpPr/>
-      </dsp:nvSpPr>
-      <dsp:spPr>
-        <a:xfrm>
-          <a:off x="0" y="1707713"/>
-          <a:ext cx="7315200" cy="1705213"/>
-        </a:xfrm>
-        <a:prstGeom prst="rect">
-          <a:avLst/>
-        </a:prstGeom>
-        <a:noFill/>
-        <a:ln>
-          <a:noFill/>
-        </a:ln>
-        <a:effectLst/>
-      </dsp:spPr>
-      <dsp:style>
-        <a:lnRef idx="0">
-          <a:scrgbClr r="0" g="0" b="0"/>
-        </a:lnRef>
-        <a:fillRef idx="0">
-          <a:scrgbClr r="0" g="0" b="0"/>
-        </a:fillRef>
-        <a:effectRef idx="0">
-          <a:scrgbClr r="0" g="0" b="0"/>
-        </a:effectRef>
-        <a:fontRef idx="minor"/>
-      </dsp:style>
       <dsp:txBody>
-        <a:bodyPr spcFirstLastPara="0" vert="horz" wrap="square" lIns="64770" tIns="64770" rIns="64770" bIns="64770" numCol="1" spcCol="1270" anchor="t" anchorCtr="0">
+        <a:bodyPr spcFirstLastPara="0" vert="horz" wrap="square" lIns="68580" tIns="68580" rIns="68580" bIns="68580" numCol="1" spcCol="1270" anchor="ctr" anchorCtr="0">
           <a:noAutofit/>
         </a:bodyPr>
         <a:lstStyle/>
         <a:p>
-          <a:pPr marL="0" lvl="0" indent="0" algn="l" defTabSz="755650">
+          <a:pPr marL="0" lvl="0" indent="0" algn="l" defTabSz="800100">
             <a:lnSpc>
               <a:spcPct val="90000"/>
             </a:lnSpc>
@@ -4208,50 +4742,50 @@
             <a:buNone/>
           </a:pPr>
           <a:r>
-            <a:rPr lang="en-US" sz="1700" kern="1200"/>
+            <a:rPr lang="en-US" sz="1800" kern="1200"/>
             <a:t>WinUI 3 roadmap on GitHub: </a:t>
           </a:r>
           <a:r>
-            <a:rPr lang="en-US" sz="1700" kern="1200">
+            <a:rPr lang="en-US" sz="1800" kern="1200">
               <a:hlinkClick xmlns:r="http://schemas.openxmlformats.org/officeDocument/2006/relationships" r:id="rId1"/>
             </a:rPr>
             <a:t>https://github.com/microsoft/microsoft-ui-xaml/blob/main/docs/roadmap.md</a:t>
           </a:r>
           <a:r>
-            <a:rPr lang="en-US" sz="1700" kern="1200"/>
+            <a:rPr lang="en-US" sz="1800" kern="1200"/>
             <a:t> </a:t>
           </a:r>
         </a:p>
       </dsp:txBody>
       <dsp:txXfrm>
-        <a:off x="0" y="1707713"/>
-        <a:ext cx="7315200" cy="1705213"/>
+        <a:off x="34906" y="3275661"/>
+        <a:ext cx="7658455" cy="645240"/>
       </dsp:txXfrm>
     </dsp:sp>
-    <dsp:sp modelId="{475BBA90-5DF3-4C43-9D96-A4022BD4CAE9}">
+    <dsp:sp modelId="{BFFDD1B2-ED31-4779-97B3-01E417A0EE2F}">
       <dsp:nvSpPr>
         <dsp:cNvPr id="0" name=""/>
         <dsp:cNvSpPr/>
       </dsp:nvSpPr>
       <dsp:spPr>
         <a:xfrm>
-          <a:off x="0" y="3412926"/>
-          <a:ext cx="7315200" cy="0"/>
+          <a:off x="0" y="4007648"/>
+          <a:ext cx="7728267" cy="715052"/>
         </a:xfrm>
-        <a:prstGeom prst="line">
+        <a:prstGeom prst="roundRect">
           <a:avLst/>
         </a:prstGeom>
         <a:solidFill>
-          <a:schemeClr val="accent1">
-            <a:hueOff val="0"/>
-            <a:satOff val="0"/>
-            <a:lumOff val="0"/>
+          <a:schemeClr val="accent5">
+            <a:hueOff val="11178319"/>
+            <a:satOff val="-9634"/>
+            <a:lumOff val="12746"/>
             <a:alphaOff val="0"/>
           </a:schemeClr>
         </a:solidFill>
         <a:ln w="10795" cap="flat" cmpd="sng" algn="ctr">
           <a:solidFill>
-            <a:schemeClr val="accent1">
+            <a:schemeClr val="lt1">
               <a:hueOff val="0"/>
               <a:satOff val="0"/>
               <a:lumOff val="0"/>
@@ -4276,45 +4810,13 @@
           <a:schemeClr val="lt1"/>
         </a:fontRef>
       </dsp:style>
-    </dsp:sp>
-    <dsp:sp modelId="{0A35448F-9BC4-1F42-9F3A-0B4121D5D726}">
-      <dsp:nvSpPr>
-        <dsp:cNvPr id="0" name=""/>
-        <dsp:cNvSpPr/>
-      </dsp:nvSpPr>
-      <dsp:spPr>
-        <a:xfrm>
-          <a:off x="0" y="3412926"/>
-          <a:ext cx="7315200" cy="1705213"/>
-        </a:xfrm>
-        <a:prstGeom prst="rect">
-          <a:avLst/>
-        </a:prstGeom>
-        <a:noFill/>
-        <a:ln>
-          <a:noFill/>
-        </a:ln>
-        <a:effectLst/>
-      </dsp:spPr>
-      <dsp:style>
-        <a:lnRef idx="0">
-          <a:scrgbClr r="0" g="0" b="0"/>
-        </a:lnRef>
-        <a:fillRef idx="0">
-          <a:scrgbClr r="0" g="0" b="0"/>
-        </a:fillRef>
-        <a:effectRef idx="0">
-          <a:scrgbClr r="0" g="0" b="0"/>
-        </a:effectRef>
-        <a:fontRef idx="minor"/>
-      </dsp:style>
       <dsp:txBody>
-        <a:bodyPr spcFirstLastPara="0" vert="horz" wrap="square" lIns="64770" tIns="64770" rIns="64770" bIns="64770" numCol="1" spcCol="1270" anchor="t" anchorCtr="0">
+        <a:bodyPr spcFirstLastPara="0" vert="horz" wrap="square" lIns="68580" tIns="68580" rIns="68580" bIns="68580" numCol="1" spcCol="1270" anchor="ctr" anchorCtr="0">
           <a:noAutofit/>
         </a:bodyPr>
         <a:lstStyle/>
         <a:p>
-          <a:pPr marL="0" lvl="0" indent="0" algn="l" defTabSz="755650">
+          <a:pPr marL="0" lvl="0" indent="0" algn="l" defTabSz="800100">
             <a:lnSpc>
               <a:spcPct val="90000"/>
             </a:lnSpc>
@@ -4327,24 +4829,24 @@
             <a:buNone/>
           </a:pPr>
           <a:r>
-            <a:rPr lang="en-US" sz="1700" kern="1200"/>
+            <a:rPr lang="en-US" sz="1800" kern="1200"/>
             <a:t>Windows App SDK roadmap on GitHub: </a:t>
           </a:r>
           <a:r>
-            <a:rPr lang="en-US" sz="1700" kern="1200">
+            <a:rPr lang="en-US" sz="1800" kern="1200">
               <a:hlinkClick xmlns:r="http://schemas.openxmlformats.org/officeDocument/2006/relationships" r:id="rId2"/>
             </a:rPr>
             <a:t>https://github.com/microsoft/WindowsAppSDK/blob/main/docs/roadmap.md</a:t>
           </a:r>
           <a:r>
-            <a:rPr lang="en-US" sz="1700" kern="1200"/>
+            <a:rPr lang="en-US" sz="1800" kern="1200"/>
             <a:t> </a:t>
           </a:r>
         </a:p>
       </dsp:txBody>
       <dsp:txXfrm>
-        <a:off x="0" y="3412926"/>
-        <a:ext cx="7315200" cy="1705213"/>
+        <a:off x="34906" y="4042554"/>
+        <a:ext cx="7658455" cy="645240"/>
       </dsp:txXfrm>
     </dsp:sp>
   </dsp:spTree>
@@ -4410,7 +4912,7 @@
       <dsp:spPr>
         <a:xfrm>
           <a:off x="1064618" y="1424600"/>
-          <a:ext cx="1141874" cy="1141874"/>
+          <a:ext cx="1141875" cy="1141875"/>
         </a:xfrm>
         <a:prstGeom prst="rect">
           <a:avLst/>
@@ -4563,7 +5065,7 @@
       <dsp:spPr>
         <a:xfrm>
           <a:off x="4898055" y="1424600"/>
-          <a:ext cx="1141874" cy="1141874"/>
+          <a:ext cx="1141875" cy="1141875"/>
         </a:xfrm>
         <a:prstGeom prst="rect">
           <a:avLst/>
@@ -4974,12 +5476,12 @@
 </file>
 
 <file path=ppt/diagrams/layout2.xml><?xml version="1.0" encoding="utf-8"?>
-<dgm:layoutDef xmlns:dgm="http://schemas.openxmlformats.org/drawingml/2006/diagram" xmlns:a="http://schemas.openxmlformats.org/drawingml/2006/main" uniqueId="urn:microsoft.com/office/officeart/2008/layout/LinedList">
+<dgm:layoutDef xmlns:dgm="http://schemas.openxmlformats.org/drawingml/2006/diagram" xmlns:a="http://schemas.openxmlformats.org/drawingml/2006/main" uniqueId="urn:microsoft.com/office/officeart/2005/8/layout/vList2">
   <dgm:title val=""/>
   <dgm:desc val=""/>
   <dgm:catLst>
-    <dgm:cat type="hierarchy" pri="8000"/>
-    <dgm:cat type="list" pri="2500"/>
+    <dgm:cat type="list" pri="3000"/>
+    <dgm:cat type="convert" pri="1000"/>
   </dgm:catLst>
   <dgm:sampData>
     <dgm:dataModel>
@@ -4991,18 +5493,18 @@
         <dgm:pt modelId="11">
           <dgm:prSet phldr="1"/>
         </dgm:pt>
-        <dgm:pt modelId="12">
+        <dgm:pt modelId="2">
           <dgm:prSet phldr="1"/>
         </dgm:pt>
-        <dgm:pt modelId="13">
+        <dgm:pt modelId="21">
           <dgm:prSet phldr="1"/>
         </dgm:pt>
       </dgm:ptLst>
       <dgm:cxnLst>
-        <dgm:cxn modelId="2" srcId="0" destId="1" srcOrd="0" destOrd="0"/>
-        <dgm:cxn modelId="3" srcId="1" destId="11" srcOrd="0" destOrd="0"/>
-        <dgm:cxn modelId="4" srcId="1" destId="12" srcOrd="1" destOrd="0"/>
-        <dgm:cxn modelId="5" srcId="1" destId="13" srcOrd="2" destOrd="0"/>
+        <dgm:cxn modelId="4" srcId="0" destId="1" srcOrd="0" destOrd="0"/>
+        <dgm:cxn modelId="5" srcId="0" destId="2" srcOrd="1" destOrd="0"/>
+        <dgm:cxn modelId="12" srcId="1" destId="11" srcOrd="0" destOrd="0"/>
+        <dgm:cxn modelId="23" srcId="2" destId="21" srcOrd="0" destOrd="0"/>
       </dgm:cxnLst>
       <dgm:bg/>
       <dgm:whole/>
@@ -5012,20 +5514,12 @@
     <dgm:dataModel>
       <dgm:ptLst>
         <dgm:pt modelId="0" type="doc"/>
-        <dgm:pt modelId="1">
-          <dgm:prSet phldr="1"/>
-        </dgm:pt>
-        <dgm:pt modelId="11">
-          <dgm:prSet phldr="1"/>
-        </dgm:pt>
-        <dgm:pt modelId="12">
-          <dgm:prSet phldr="1"/>
-        </dgm:pt>
+        <dgm:pt modelId="1"/>
+        <dgm:pt modelId="2"/>
       </dgm:ptLst>
       <dgm:cxnLst>
-        <dgm:cxn modelId="2" srcId="0" destId="1" srcOrd="0" destOrd="0"/>
-        <dgm:cxn modelId="3" srcId="1" destId="11" srcOrd="0" destOrd="0"/>
-        <dgm:cxn modelId="4" srcId="1" destId="12" srcOrd="1" destOrd="0"/>
+        <dgm:cxn modelId="3" srcId="0" destId="1" srcOrd="0" destOrd="0"/>
+        <dgm:cxn modelId="4" srcId="0" destId="2" srcOrd="1" destOrd="0"/>
       </dgm:cxnLst>
       <dgm:bg/>
       <dgm:whole/>
@@ -5035,405 +5529,114 @@
     <dgm:dataModel>
       <dgm:ptLst>
         <dgm:pt modelId="0" type="doc"/>
-        <dgm:pt modelId="1">
-          <dgm:prSet phldr="1"/>
-        </dgm:pt>
-        <dgm:pt modelId="11">
-          <dgm:prSet phldr="1"/>
-        </dgm:pt>
-        <dgm:pt modelId="12">
-          <dgm:prSet phldr="1"/>
-        </dgm:pt>
+        <dgm:pt modelId="1"/>
+        <dgm:pt modelId="2"/>
+        <dgm:pt modelId="3"/>
+        <dgm:pt modelId="4"/>
       </dgm:ptLst>
       <dgm:cxnLst>
-        <dgm:cxn modelId="2" srcId="0" destId="1" srcOrd="0" destOrd="0"/>
-        <dgm:cxn modelId="3" srcId="1" destId="11" srcOrd="0" destOrd="0"/>
-        <dgm:cxn modelId="4" srcId="1" destId="12" srcOrd="1" destOrd="0"/>
+        <dgm:cxn modelId="5" srcId="0" destId="1" srcOrd="0" destOrd="0"/>
+        <dgm:cxn modelId="6" srcId="0" destId="2" srcOrd="1" destOrd="0"/>
+        <dgm:cxn modelId="7" srcId="0" destId="3" srcOrd="2" destOrd="0"/>
+        <dgm:cxn modelId="8" srcId="0" destId="4" srcOrd="3" destOrd="0"/>
       </dgm:cxnLst>
       <dgm:bg/>
       <dgm:whole/>
     </dgm:dataModel>
   </dgm:clrData>
-  <dgm:layoutNode name="vert0">
+  <dgm:layoutNode name="linear">
     <dgm:varLst>
-      <dgm:dir/>
-      <dgm:animOne val="branch"/>
       <dgm:animLvl val="lvl"/>
+      <dgm:resizeHandles val="exact"/>
     </dgm:varLst>
-    <dgm:choose name="Name0">
-      <dgm:if name="Name1" func="var" arg="dir" op="equ" val="norm">
-        <dgm:alg type="lin">
-          <dgm:param type="linDir" val="fromT"/>
-          <dgm:param type="nodeHorzAlign" val="l"/>
-        </dgm:alg>
-      </dgm:if>
-      <dgm:else name="Name2">
-        <dgm:alg type="lin">
-          <dgm:param type="linDir" val="fromT"/>
-          <dgm:param type="nodeHorzAlign" val="r"/>
-        </dgm:alg>
-      </dgm:else>
-    </dgm:choose>
+    <dgm:alg type="lin">
+      <dgm:param type="linDir" val="fromT"/>
+      <dgm:param type="vertAlign" val="mid"/>
+    </dgm:alg>
     <dgm:shape xmlns:r="http://schemas.openxmlformats.org/officeDocument/2006/relationships" r:blip="">
       <dgm:adjLst/>
     </dgm:shape>
     <dgm:presOf/>
     <dgm:constrLst>
-      <dgm:constr type="w" for="ch" forName="horz1" refType="w"/>
-      <dgm:constr type="h" for="ch" forName="horz1" refType="h"/>
-      <dgm:constr type="h" for="des" forName="vert1" refType="h"/>
-      <dgm:constr type="h" for="des" forName="tx1" refType="h"/>
-      <dgm:constr type="h" for="des" forName="horz2" refType="h"/>
-      <dgm:constr type="h" for="des" forName="vert2" refType="h"/>
-      <dgm:constr type="h" for="des" forName="horz3" refType="h"/>
-      <dgm:constr type="h" for="des" forName="vert3" refType="h"/>
-      <dgm:constr type="h" for="des" forName="horz4" refType="h"/>
-      <dgm:constr type="h" for="des" ptType="node" refType="h"/>
-      <dgm:constr type="primFontSz" for="des" forName="tx1" op="equ" val="65"/>
-      <dgm:constr type="primFontSz" for="des" forName="tx2" op="equ" val="65"/>
-      <dgm:constr type="primFontSz" for="des" forName="tx3" op="equ" val="65"/>
-      <dgm:constr type="primFontSz" for="des" forName="tx4" op="equ" val="65"/>
-      <dgm:constr type="w" for="des" forName="thickLine" refType="w"/>
-      <dgm:constr type="h" for="des" forName="thickLine"/>
-      <dgm:constr type="h" for="des" forName="thinLine1"/>
-      <dgm:constr type="h" for="des" forName="thinLine2b"/>
-      <dgm:constr type="h" for="des" forName="thinLine3"/>
-      <dgm:constr type="h" for="des" forName="vertSpace2a" refType="h" fact="0.05"/>
-      <dgm:constr type="h" for="des" forName="vertSpace2b" refType="h" refFor="des" refForName="vertSpace2a"/>
+      <dgm:constr type="w" for="ch" forName="parentText" refType="w"/>
+      <dgm:constr type="h" for="ch" forName="parentText" refType="primFontSz" refFor="ch" refForName="parentText" fact="0.52"/>
+      <dgm:constr type="w" for="ch" forName="childText" refType="w"/>
+      <dgm:constr type="h" for="ch" forName="childText" refType="primFontSz" refFor="ch" refForName="parentText" fact="0.46"/>
+      <dgm:constr type="h" for="ch" forName="parentText" op="equ"/>
+      <dgm:constr type="primFontSz" for="ch" forName="parentText" op="equ" val="65"/>
+      <dgm:constr type="primFontSz" for="ch" forName="childText" refType="primFontSz" refFor="ch" refForName="parentText" op="equ"/>
+      <dgm:constr type="h" for="ch" forName="spacer" refType="primFontSz" refFor="ch" refForName="parentText" fact="0.08"/>
     </dgm:constrLst>
-    <dgm:forEach name="Name3" axis="ch" ptType="node">
-      <dgm:layoutNode name="thickLine" styleLbl="alignNode1">
-        <dgm:alg type="sp"/>
-        <dgm:shape xmlns:r="http://schemas.openxmlformats.org/officeDocument/2006/relationships" type="line" r:blip="">
+    <dgm:ruleLst>
+      <dgm:rule type="primFontSz" for="ch" forName="parentText" val="5" fact="NaN" max="NaN"/>
+    </dgm:ruleLst>
+    <dgm:forEach name="Name0" axis="ch" ptType="node">
+      <dgm:layoutNode name="parentText" styleLbl="node1">
+        <dgm:varLst>
+          <dgm:chMax val="0"/>
+          <dgm:bulletEnabled val="1"/>
+        </dgm:varLst>
+        <dgm:alg type="tx">
+          <dgm:param type="parTxLTRAlign" val="l"/>
+          <dgm:param type="parTxRTLAlign" val="r"/>
+        </dgm:alg>
+        <dgm:shape xmlns:r="http://schemas.openxmlformats.org/officeDocument/2006/relationships" type="roundRect" r:blip="">
           <dgm:adjLst/>
         </dgm:shape>
-        <dgm:presOf/>
+        <dgm:presOf axis="self"/>
+        <dgm:constrLst>
+          <dgm:constr type="tMarg" refType="primFontSz" fact="0.3"/>
+          <dgm:constr type="bMarg" refType="primFontSz" fact="0.3"/>
+          <dgm:constr type="lMarg" refType="primFontSz" fact="0.3"/>
+          <dgm:constr type="rMarg" refType="primFontSz" fact="0.3"/>
+        </dgm:constrLst>
+        <dgm:ruleLst>
+          <dgm:rule type="h" val="INF" fact="NaN" max="NaN"/>
+        </dgm:ruleLst>
       </dgm:layoutNode>
-      <dgm:layoutNode name="horz1">
-        <dgm:choose name="Name4">
-          <dgm:if name="Name5" func="var" arg="dir" op="equ" val="norm">
-            <dgm:alg type="lin">
-              <dgm:param type="linDir" val="fromL"/>
-              <dgm:param type="nodeVertAlign" val="t"/>
+      <dgm:choose name="Name1">
+        <dgm:if name="Name2" axis="ch" ptType="node" func="cnt" op="gte" val="1">
+          <dgm:layoutNode name="childText" styleLbl="revTx">
+            <dgm:varLst>
+              <dgm:bulletEnabled val="1"/>
+            </dgm:varLst>
+            <dgm:alg type="tx">
+              <dgm:param type="stBulletLvl" val="1"/>
+              <dgm:param type="lnSpAfChP" val="20"/>
             </dgm:alg>
-          </dgm:if>
-          <dgm:else name="Name6">
-            <dgm:alg type="lin">
-              <dgm:param type="linDir" val="fromR"/>
-              <dgm:param type="nodeVertAlign" val="t"/>
-            </dgm:alg>
-          </dgm:else>
-        </dgm:choose>
-        <dgm:shape xmlns:r="http://schemas.openxmlformats.org/officeDocument/2006/relationships" r:blip="">
-          <dgm:adjLst/>
-        </dgm:shape>
-        <dgm:presOf/>
-        <dgm:choose name="Name7">
-          <dgm:if name="Name8" axis="root des" func="maxDepth" op="equ" val="1">
+            <dgm:shape xmlns:r="http://schemas.openxmlformats.org/officeDocument/2006/relationships" type="rect" r:blip="">
+              <dgm:adjLst/>
+            </dgm:shape>
+            <dgm:presOf axis="des" ptType="node"/>
             <dgm:constrLst>
-              <dgm:constr type="w" for="ch" forName="tx1" refType="w"/>
+              <dgm:constr type="tMarg" refType="primFontSz" fact="0.1"/>
+              <dgm:constr type="bMarg" refType="primFontSz" fact="0.1"/>
+              <dgm:constr type="lMarg" refType="w" fact="0.09"/>
             </dgm:constrLst>
-          </dgm:if>
-          <dgm:if name="Name9" axis="root des" func="maxDepth" op="equ" val="2">
-            <dgm:constrLst>
-              <dgm:constr type="w" for="ch" forName="tx1" refType="w" fact="0.2"/>
-              <dgm:constr type="w" for="des" forName="tx2" refType="w" fact="0.785"/>
-              <dgm:constr type="w" for="des" forName="horzSpace2" refType="w" fact="0.015"/>
-              <dgm:constr type="w" for="des" forName="thinLine2b" refType="w" fact="0.8"/>
-            </dgm:constrLst>
-          </dgm:if>
-          <dgm:if name="Name10" axis="root des" func="maxDepth" op="equ" val="3">
-            <dgm:constrLst>
-              <dgm:constr type="w" for="ch" forName="tx1" refType="w" fact="0.2"/>
-              <dgm:constr type="w" for="des" forName="tx2" refType="w" fact="0.385"/>
-              <dgm:constr type="w" for="des" forName="tx3" refType="w" fact="0.385"/>
-              <dgm:constr type="w" for="des" forName="horzSpace2" refType="w" fact="0.015"/>
-              <dgm:constr type="w" for="des" forName="horzSpace3" refType="w" fact="0.015"/>
-              <dgm:constr type="w" for="des" forName="thinLine2b" refType="w" fact="0.8"/>
-              <dgm:constr type="w" for="des" forName="thinLine3" refType="w" fact="0.385"/>
-            </dgm:constrLst>
-          </dgm:if>
-          <dgm:if name="Name11" axis="root des" func="maxDepth" op="gte" val="4">
-            <dgm:constrLst>
-              <dgm:constr type="w" for="ch" forName="tx1" refType="w" fact="0.2"/>
-              <dgm:constr type="w" for="des" forName="tx2" refType="w" fact="0.2516"/>
-              <dgm:constr type="w" for="des" forName="tx3" refType="w" fact="0.2516"/>
-              <dgm:constr type="w" for="des" forName="tx4" refType="w" fact="0.2516"/>
-              <dgm:constr type="w" for="des" forName="horzSpace2" refType="w" fact="0.015"/>
-              <dgm:constr type="w" for="des" forName="horzSpace3" refType="w" fact="0.015"/>
-              <dgm:constr type="w" for="des" forName="horzSpace4" refType="w" fact="0.015"/>
-              <dgm:constr type="w" for="des" forName="thinLine2b" refType="w" fact="0.8"/>
-              <dgm:constr type="w" for="des" forName="thinLine3" refType="w" fact="0.5332"/>
-            </dgm:constrLst>
-          </dgm:if>
-          <dgm:else name="Name12"/>
-        </dgm:choose>
-        <dgm:layoutNode name="tx1" styleLbl="revTx">
-          <dgm:alg type="tx">
-            <dgm:param type="parTxLTRAlign" val="l"/>
-            <dgm:param type="parTxRTLAlign" val="r"/>
-            <dgm:param type="txAnchorVert" val="t"/>
-          </dgm:alg>
-          <dgm:shape xmlns:r="http://schemas.openxmlformats.org/officeDocument/2006/relationships" type="rect" r:blip="">
-            <dgm:adjLst/>
-          </dgm:shape>
-          <dgm:presOf axis="self"/>
-          <dgm:constrLst>
-            <dgm:constr type="tMarg" refType="primFontSz" fact="0.3"/>
-            <dgm:constr type="bMarg" refType="primFontSz" fact="0.3"/>
-            <dgm:constr type="lMarg" refType="primFontSz" fact="0.3"/>
-            <dgm:constr type="rMarg" refType="primFontSz" fact="0.3"/>
-          </dgm:constrLst>
-          <dgm:ruleLst>
-            <dgm:rule type="primFontSz" val="5" fact="NaN" max="NaN"/>
-          </dgm:ruleLst>
-        </dgm:layoutNode>
-        <dgm:layoutNode name="vert1">
-          <dgm:choose name="Name13">
-            <dgm:if name="Name14" func="var" arg="dir" op="equ" val="norm">
-              <dgm:alg type="lin">
-                <dgm:param type="linDir" val="fromT"/>
-                <dgm:param type="nodeHorzAlign" val="l"/>
-              </dgm:alg>
-            </dgm:if>
-            <dgm:else name="Name15">
-              <dgm:alg type="lin">
-                <dgm:param type="linDir" val="fromT"/>
-                <dgm:param type="nodeHorzAlign" val="r"/>
-              </dgm:alg>
-            </dgm:else>
-          </dgm:choose>
-          <dgm:shape xmlns:r="http://schemas.openxmlformats.org/officeDocument/2006/relationships" r:blip="">
-            <dgm:adjLst/>
-          </dgm:shape>
-          <dgm:presOf/>
-          <dgm:forEach name="Name16" axis="ch" ptType="node">
-            <dgm:choose name="Name17">
-              <dgm:if name="Name18" axis="self" ptType="node" func="pos" op="equ" val="1">
-                <dgm:layoutNode name="vertSpace2a">
+            <dgm:ruleLst>
+              <dgm:rule type="h" val="INF" fact="NaN" max="NaN"/>
+            </dgm:ruleLst>
+          </dgm:layoutNode>
+        </dgm:if>
+        <dgm:else name="Name3">
+          <dgm:choose name="Name4">
+            <dgm:if name="Name5" axis="par ch" ptType="doc node" func="cnt" op="gte" val="2">
+              <dgm:forEach name="Name6" axis="followSib" ptType="sibTrans" cnt="1">
+                <dgm:layoutNode name="spacer">
                   <dgm:alg type="sp"/>
                   <dgm:shape xmlns:r="http://schemas.openxmlformats.org/officeDocument/2006/relationships" r:blip="">
                     <dgm:adjLst/>
                   </dgm:shape>
                   <dgm:presOf/>
+                  <dgm:constrLst/>
+                  <dgm:ruleLst/>
                 </dgm:layoutNode>
-              </dgm:if>
-              <dgm:else name="Name19"/>
-            </dgm:choose>
-            <dgm:layoutNode name="horz2">
-              <dgm:choose name="Name20">
-                <dgm:if name="Name21" func="var" arg="dir" op="equ" val="norm">
-                  <dgm:alg type="lin">
-                    <dgm:param type="linDir" val="fromL"/>
-                    <dgm:param type="nodeVertAlign" val="t"/>
-                  </dgm:alg>
-                </dgm:if>
-                <dgm:else name="Name22">
-                  <dgm:alg type="lin">
-                    <dgm:param type="linDir" val="fromR"/>
-                    <dgm:param type="nodeVertAlign" val="t"/>
-                  </dgm:alg>
-                </dgm:else>
-              </dgm:choose>
-              <dgm:shape xmlns:r="http://schemas.openxmlformats.org/officeDocument/2006/relationships" r:blip="">
-                <dgm:adjLst/>
-              </dgm:shape>
-              <dgm:presOf/>
-              <dgm:layoutNode name="horzSpace2">
-                <dgm:alg type="sp"/>
-                <dgm:shape xmlns:r="http://schemas.openxmlformats.org/officeDocument/2006/relationships" r:blip="">
-                  <dgm:adjLst/>
-                </dgm:shape>
-                <dgm:presOf/>
-              </dgm:layoutNode>
-              <dgm:layoutNode name="tx2" styleLbl="revTx">
-                <dgm:alg type="tx">
-                  <dgm:param type="parTxLTRAlign" val="l"/>
-                  <dgm:param type="parTxRTLAlign" val="r"/>
-                  <dgm:param type="txAnchorVert" val="t"/>
-                </dgm:alg>
-                <dgm:shape xmlns:r="http://schemas.openxmlformats.org/officeDocument/2006/relationships" type="rect" r:blip="">
-                  <dgm:adjLst/>
-                </dgm:shape>
-                <dgm:presOf axis="self"/>
-                <dgm:constrLst>
-                  <dgm:constr type="tMarg" refType="primFontSz" fact="0.3"/>
-                  <dgm:constr type="bMarg" refType="primFontSz" fact="0.3"/>
-                  <dgm:constr type="lMarg" refType="primFontSz" fact="0.3"/>
-                  <dgm:constr type="rMarg" refType="primFontSz" fact="0.3"/>
-                </dgm:constrLst>
-                <dgm:ruleLst>
-                  <dgm:rule type="primFontSz" val="5" fact="NaN" max="NaN"/>
-                </dgm:ruleLst>
-              </dgm:layoutNode>
-              <dgm:layoutNode name="vert2">
-                <dgm:choose name="Name23">
-                  <dgm:if name="Name24" func="var" arg="dir" op="equ" val="norm">
-                    <dgm:alg type="lin">
-                      <dgm:param type="linDir" val="fromT"/>
-                      <dgm:param type="nodeHorzAlign" val="l"/>
-                    </dgm:alg>
-                  </dgm:if>
-                  <dgm:else name="Name25">
-                    <dgm:alg type="lin">
-                      <dgm:param type="linDir" val="fromT"/>
-                      <dgm:param type="nodeHorzAlign" val="r"/>
-                    </dgm:alg>
-                  </dgm:else>
-                </dgm:choose>
-                <dgm:shape xmlns:r="http://schemas.openxmlformats.org/officeDocument/2006/relationships" r:blip="">
-                  <dgm:adjLst/>
-                </dgm:shape>
-                <dgm:presOf/>
-                <dgm:forEach name="Name26" axis="ch" ptType="node">
-                  <dgm:layoutNode name="horz3">
-                    <dgm:choose name="Name27">
-                      <dgm:if name="Name28" func="var" arg="dir" op="equ" val="norm">
-                        <dgm:alg type="lin">
-                          <dgm:param type="linDir" val="fromL"/>
-                          <dgm:param type="nodeVertAlign" val="t"/>
-                        </dgm:alg>
-                      </dgm:if>
-                      <dgm:else name="Name29">
-                        <dgm:alg type="lin">
-                          <dgm:param type="linDir" val="fromR"/>
-                          <dgm:param type="nodeVertAlign" val="t"/>
-                        </dgm:alg>
-                      </dgm:else>
-                    </dgm:choose>
-                    <dgm:shape xmlns:r="http://schemas.openxmlformats.org/officeDocument/2006/relationships" r:blip="">
-                      <dgm:adjLst/>
-                    </dgm:shape>
-                    <dgm:presOf/>
-                    <dgm:layoutNode name="horzSpace3">
-                      <dgm:alg type="sp"/>
-                      <dgm:shape xmlns:r="http://schemas.openxmlformats.org/officeDocument/2006/relationships" r:blip="">
-                        <dgm:adjLst/>
-                      </dgm:shape>
-                      <dgm:presOf/>
-                    </dgm:layoutNode>
-                    <dgm:layoutNode name="tx3" styleLbl="revTx">
-                      <dgm:alg type="tx">
-                        <dgm:param type="parTxLTRAlign" val="l"/>
-                        <dgm:param type="parTxRTLAlign" val="r"/>
-                        <dgm:param type="txAnchorVert" val="t"/>
-                      </dgm:alg>
-                      <dgm:shape xmlns:r="http://schemas.openxmlformats.org/officeDocument/2006/relationships" type="rect" r:blip="">
-                        <dgm:adjLst/>
-                      </dgm:shape>
-                      <dgm:presOf axis="self"/>
-                      <dgm:constrLst>
-                        <dgm:constr type="tMarg" refType="primFontSz" fact="0.3"/>
-                        <dgm:constr type="bMarg" refType="primFontSz" fact="0.3"/>
-                        <dgm:constr type="lMarg" refType="primFontSz" fact="0.3"/>
-                        <dgm:constr type="rMarg" refType="primFontSz" fact="0.3"/>
-                      </dgm:constrLst>
-                      <dgm:ruleLst>
-                        <dgm:rule type="primFontSz" val="5" fact="NaN" max="NaN"/>
-                      </dgm:ruleLst>
-                    </dgm:layoutNode>
-                    <dgm:layoutNode name="vert3">
-                      <dgm:choose name="Name30">
-                        <dgm:if name="Name31" func="var" arg="dir" op="equ" val="norm">
-                          <dgm:alg type="lin">
-                            <dgm:param type="linDir" val="fromT"/>
-                            <dgm:param type="nodeHorzAlign" val="l"/>
-                          </dgm:alg>
-                        </dgm:if>
-                        <dgm:else name="Name32">
-                          <dgm:alg type="lin">
-                            <dgm:param type="linDir" val="fromT"/>
-                            <dgm:param type="nodeHorzAlign" val="r"/>
-                          </dgm:alg>
-                        </dgm:else>
-                      </dgm:choose>
-                      <dgm:shape xmlns:r="http://schemas.openxmlformats.org/officeDocument/2006/relationships" r:blip="">
-                        <dgm:adjLst/>
-                      </dgm:shape>
-                      <dgm:presOf/>
-                      <dgm:forEach name="Name33" axis="ch" ptType="node">
-                        <dgm:layoutNode name="horz4">
-                          <dgm:choose name="Name34">
-                            <dgm:if name="Name35" func="var" arg="dir" op="equ" val="norm">
-                              <dgm:alg type="lin">
-                                <dgm:param type="linDir" val="fromL"/>
-                                <dgm:param type="nodeVertAlign" val="t"/>
-                              </dgm:alg>
-                            </dgm:if>
-                            <dgm:else name="Name36">
-                              <dgm:alg type="lin">
-                                <dgm:param type="linDir" val="fromR"/>
-                                <dgm:param type="nodeVertAlign" val="t"/>
-                              </dgm:alg>
-                            </dgm:else>
-                          </dgm:choose>
-                          <dgm:shape xmlns:r="http://schemas.openxmlformats.org/officeDocument/2006/relationships" r:blip="">
-                            <dgm:adjLst/>
-                          </dgm:shape>
-                          <dgm:presOf/>
-                          <dgm:layoutNode name="horzSpace4">
-                            <dgm:alg type="sp"/>
-                            <dgm:shape xmlns:r="http://schemas.openxmlformats.org/officeDocument/2006/relationships" r:blip="">
-                              <dgm:adjLst/>
-                            </dgm:shape>
-                            <dgm:presOf/>
-                          </dgm:layoutNode>
-                          <dgm:layoutNode name="tx4" styleLbl="revTx">
-                            <dgm:varLst>
-                              <dgm:bulletEnabled val="1"/>
-                            </dgm:varLst>
-                            <dgm:alg type="tx">
-                              <dgm:param type="parTxLTRAlign" val="l"/>
-                              <dgm:param type="parTxRTLAlign" val="r"/>
-                              <dgm:param type="txAnchorVert" val="t"/>
-                            </dgm:alg>
-                            <dgm:shape xmlns:r="http://schemas.openxmlformats.org/officeDocument/2006/relationships" type="rect" r:blip="">
-                              <dgm:adjLst/>
-                            </dgm:shape>
-                            <dgm:presOf axis="desOrSelf" ptType="node"/>
-                            <dgm:constrLst>
-                              <dgm:constr type="tMarg" refType="primFontSz" fact="0.3"/>
-                              <dgm:constr type="bMarg" refType="primFontSz" fact="0.3"/>
-                              <dgm:constr type="lMarg" refType="primFontSz" fact="0.3"/>
-                              <dgm:constr type="rMarg" refType="primFontSz" fact="0.3"/>
-                            </dgm:constrLst>
-                            <dgm:ruleLst>
-                              <dgm:rule type="primFontSz" val="5" fact="NaN" max="NaN"/>
-                            </dgm:ruleLst>
-                          </dgm:layoutNode>
-                        </dgm:layoutNode>
-                      </dgm:forEach>
-                    </dgm:layoutNode>
-                  </dgm:layoutNode>
-                  <dgm:forEach name="Name37" axis="followSib" ptType="sibTrans" cnt="1">
-                    <dgm:layoutNode name="thinLine3" styleLbl="callout">
-                      <dgm:alg type="sp"/>
-                      <dgm:shape xmlns:r="http://schemas.openxmlformats.org/officeDocument/2006/relationships" type="line" r:blip="">
-                        <dgm:adjLst/>
-                      </dgm:shape>
-                      <dgm:presOf/>
-                    </dgm:layoutNode>
-                  </dgm:forEach>
-                </dgm:forEach>
-              </dgm:layoutNode>
-            </dgm:layoutNode>
-            <dgm:layoutNode name="thinLine2b" styleLbl="callout">
-              <dgm:alg type="sp"/>
-              <dgm:shape xmlns:r="http://schemas.openxmlformats.org/officeDocument/2006/relationships" type="line" r:blip="">
-                <dgm:adjLst/>
-              </dgm:shape>
-              <dgm:presOf/>
-            </dgm:layoutNode>
-            <dgm:layoutNode name="vertSpace2b">
-              <dgm:alg type="sp"/>
-              <dgm:shape xmlns:r="http://schemas.openxmlformats.org/officeDocument/2006/relationships" r:blip="">
-                <dgm:adjLst/>
-              </dgm:shape>
-              <dgm:presOf/>
-            </dgm:layoutNode>
-          </dgm:forEach>
-        </dgm:layoutNode>
-      </dgm:layoutNode>
+              </dgm:forEach>
+            </dgm:if>
+            <dgm:else name="Name7"/>
+          </dgm:choose>
+        </dgm:else>
+      </dgm:choose>
     </dgm:forEach>
   </dgm:layoutNode>
 </dgm:layoutDef>
@@ -8850,7 +9053,7 @@
           <a:p>
             <a:fld id="{45CFAEDD-A751-C04A-A7A5-56DFB8A65EE6}" type="datetimeFigureOut">
               <a:rPr lang="en-US" smtClean="0"/>
-              <a:t>3/2/24</a:t>
+              <a:t>3/10/2024</a:t>
             </a:fld>
             <a:endParaRPr lang="en-US"/>
           </a:p>
@@ -9181,13 +9384,8 @@
           <a:p>
             <a:r>
               <a:rPr lang="en-US" dirty="0"/>
-              <a:t>If you joined us last month, you heard about the various options for Windows developers. This month, we’re going to drill down into the latest option </a:t>
-            </a:r>
-            <a:r>
-              <a:rPr lang="en-US"/>
-              <a:t>from Microsoft.</a:t>
-            </a:r>
-            <a:endParaRPr lang="en-US" dirty="0"/>
+              <a:t>If you joined us last month, you heard about the various options for Windows developers. This month, we’re going to drill down into the latest option from Microsoft.</a:t>
+            </a:r>
           </a:p>
         </p:txBody>
       </p:sp>
@@ -9494,6 +9692,567 @@
     <p:extLst>
       <p:ext uri="{BB962C8B-B14F-4D97-AF65-F5344CB8AC3E}">
         <p14:creationId xmlns:p14="http://schemas.microsoft.com/office/powerpoint/2010/main" val="1958153512"/>
+      </p:ext>
+    </p:extLst>
+  </p:cSld>
+  <p:clrMapOvr>
+    <a:masterClrMapping/>
+  </p:clrMapOvr>
+</p:notes>
+</file>
+
+<file path=ppt/notesSlides/notesSlide4.xml><?xml version="1.0" encoding="utf-8"?>
+<p:notes xmlns:a="http://schemas.openxmlformats.org/drawingml/2006/main" xmlns:r="http://schemas.openxmlformats.org/officeDocument/2006/relationships" xmlns:p="http://schemas.openxmlformats.org/presentationml/2006/main">
+  <p:cSld>
+    <p:spTree>
+      <p:nvGrpSpPr>
+        <p:cNvPr id="1" name=""/>
+        <p:cNvGrpSpPr/>
+        <p:nvPr/>
+      </p:nvGrpSpPr>
+      <p:grpSpPr>
+        <a:xfrm>
+          <a:off x="0" y="0"/>
+          <a:ext cx="0" cy="0"/>
+          <a:chOff x="0" y="0"/>
+          <a:chExt cx="0" cy="0"/>
+        </a:xfrm>
+      </p:grpSpPr>
+      <p:sp>
+        <p:nvSpPr>
+          <p:cNvPr id="2" name="Slide Image Placeholder 1"/>
+          <p:cNvSpPr>
+            <a:spLocks noGrp="1" noRot="1" noChangeAspect="1"/>
+          </p:cNvSpPr>
+          <p:nvPr>
+            <p:ph type="sldImg"/>
+          </p:nvPr>
+        </p:nvSpPr>
+        <p:spPr/>
+      </p:sp>
+      <p:sp>
+        <p:nvSpPr>
+          <p:cNvPr id="3" name="Notes Placeholder 2"/>
+          <p:cNvSpPr>
+            <a:spLocks noGrp="1"/>
+          </p:cNvSpPr>
+          <p:nvPr>
+            <p:ph type="body" idx="1"/>
+          </p:nvPr>
+        </p:nvSpPr>
+        <p:spPr/>
+        <p:txBody>
+          <a:bodyPr/>
+          <a:lstStyle/>
+          <a:p>
+            <a:r>
+              <a:rPr lang="en-US" dirty="0"/>
+              <a:t>Create new WinUI 3 in Desktop project</a:t>
+            </a:r>
+          </a:p>
+          <a:p>
+            <a:endParaRPr lang="en-US" dirty="0"/>
+          </a:p>
+          <a:p>
+            <a:r>
+              <a:rPr lang="en-US" dirty="0"/>
+              <a:t>Open Chapter 5 to explore controls and MVVM concepts</a:t>
+            </a:r>
+          </a:p>
+          <a:p>
+            <a:endParaRPr lang="en-US" dirty="0"/>
+          </a:p>
+        </p:txBody>
+      </p:sp>
+      <p:sp>
+        <p:nvSpPr>
+          <p:cNvPr id="4" name="Slide Number Placeholder 3"/>
+          <p:cNvSpPr>
+            <a:spLocks noGrp="1"/>
+          </p:cNvSpPr>
+          <p:nvPr>
+            <p:ph type="sldNum" sz="quarter" idx="5"/>
+          </p:nvPr>
+        </p:nvSpPr>
+        <p:spPr/>
+        <p:txBody>
+          <a:bodyPr/>
+          <a:lstStyle/>
+          <a:p>
+            <a:fld id="{B24C3CE9-E430-0042-A738-50E8105E4176}" type="slidenum">
+              <a:rPr lang="en-US" smtClean="0"/>
+              <a:t>6</a:t>
+            </a:fld>
+            <a:endParaRPr lang="en-US"/>
+          </a:p>
+        </p:txBody>
+      </p:sp>
+    </p:spTree>
+    <p:extLst>
+      <p:ext uri="{BB962C8B-B14F-4D97-AF65-F5344CB8AC3E}">
+        <p14:creationId xmlns:p14="http://schemas.microsoft.com/office/powerpoint/2010/main" val="1307438610"/>
+      </p:ext>
+    </p:extLst>
+  </p:cSld>
+  <p:clrMapOvr>
+    <a:masterClrMapping/>
+  </p:clrMapOvr>
+</p:notes>
+</file>
+
+<file path=ppt/notesSlides/notesSlide5.xml><?xml version="1.0" encoding="utf-8"?>
+<p:notes xmlns:a="http://schemas.openxmlformats.org/drawingml/2006/main" xmlns:r="http://schemas.openxmlformats.org/officeDocument/2006/relationships" xmlns:p="http://schemas.openxmlformats.org/presentationml/2006/main">
+  <p:cSld>
+    <p:spTree>
+      <p:nvGrpSpPr>
+        <p:cNvPr id="1" name=""/>
+        <p:cNvGrpSpPr/>
+        <p:nvPr/>
+      </p:nvGrpSpPr>
+      <p:grpSpPr>
+        <a:xfrm>
+          <a:off x="0" y="0"/>
+          <a:ext cx="0" cy="0"/>
+          <a:chOff x="0" y="0"/>
+          <a:chExt cx="0" cy="0"/>
+        </a:xfrm>
+      </p:grpSpPr>
+      <p:sp>
+        <p:nvSpPr>
+          <p:cNvPr id="2" name="Slide Image Placeholder 1"/>
+          <p:cNvSpPr>
+            <a:spLocks noGrp="1" noRot="1" noChangeAspect="1"/>
+          </p:cNvSpPr>
+          <p:nvPr>
+            <p:ph type="sldImg"/>
+          </p:nvPr>
+        </p:nvSpPr>
+        <p:spPr/>
+      </p:sp>
+      <p:sp>
+        <p:nvSpPr>
+          <p:cNvPr id="3" name="Notes Placeholder 2"/>
+          <p:cNvSpPr>
+            <a:spLocks noGrp="1"/>
+          </p:cNvSpPr>
+          <p:nvPr>
+            <p:ph type="body" idx="1"/>
+          </p:nvPr>
+        </p:nvSpPr>
+        <p:spPr/>
+        <p:txBody>
+          <a:bodyPr/>
+          <a:lstStyle/>
+          <a:p>
+            <a:r>
+              <a:rPr lang="en-US" dirty="0"/>
+              <a:t>Show WCT gallery app</a:t>
+            </a:r>
+          </a:p>
+          <a:p>
+            <a:endParaRPr lang="en-US" dirty="0"/>
+          </a:p>
+          <a:p>
+            <a:r>
+              <a:rPr lang="en-US" dirty="0"/>
+              <a:t>Chapter 9 code has Community Toolkit controls</a:t>
+            </a:r>
+          </a:p>
+          <a:p>
+            <a:endParaRPr lang="en-US" dirty="0"/>
+          </a:p>
+          <a:p>
+            <a:endParaRPr lang="en-US" dirty="0"/>
+          </a:p>
+        </p:txBody>
+      </p:sp>
+      <p:sp>
+        <p:nvSpPr>
+          <p:cNvPr id="4" name="Slide Number Placeholder 3"/>
+          <p:cNvSpPr>
+            <a:spLocks noGrp="1"/>
+          </p:cNvSpPr>
+          <p:nvPr>
+            <p:ph type="sldNum" sz="quarter" idx="5"/>
+          </p:nvPr>
+        </p:nvSpPr>
+        <p:spPr/>
+        <p:txBody>
+          <a:bodyPr/>
+          <a:lstStyle/>
+          <a:p>
+            <a:fld id="{B24C3CE9-E430-0042-A738-50E8105E4176}" type="slidenum">
+              <a:rPr lang="en-US" smtClean="0"/>
+              <a:t>7</a:t>
+            </a:fld>
+            <a:endParaRPr lang="en-US"/>
+          </a:p>
+        </p:txBody>
+      </p:sp>
+    </p:spTree>
+    <p:extLst>
+      <p:ext uri="{BB962C8B-B14F-4D97-AF65-F5344CB8AC3E}">
+        <p14:creationId xmlns:p14="http://schemas.microsoft.com/office/powerpoint/2010/main" val="2436207506"/>
+      </p:ext>
+    </p:extLst>
+  </p:cSld>
+  <p:clrMapOvr>
+    <a:masterClrMapping/>
+  </p:clrMapOvr>
+</p:notes>
+</file>
+
+<file path=ppt/notesSlides/notesSlide6.xml><?xml version="1.0" encoding="utf-8"?>
+<p:notes xmlns:a="http://schemas.openxmlformats.org/drawingml/2006/main" xmlns:r="http://schemas.openxmlformats.org/officeDocument/2006/relationships" xmlns:p="http://schemas.openxmlformats.org/presentationml/2006/main">
+  <p:cSld>
+    <p:spTree>
+      <p:nvGrpSpPr>
+        <p:cNvPr id="1" name=""/>
+        <p:cNvGrpSpPr/>
+        <p:nvPr/>
+      </p:nvGrpSpPr>
+      <p:grpSpPr>
+        <a:xfrm>
+          <a:off x="0" y="0"/>
+          <a:ext cx="0" cy="0"/>
+          <a:chOff x="0" y="0"/>
+          <a:chExt cx="0" cy="0"/>
+        </a:xfrm>
+      </p:grpSpPr>
+      <p:sp>
+        <p:nvSpPr>
+          <p:cNvPr id="2" name="Slide Image Placeholder 1"/>
+          <p:cNvSpPr>
+            <a:spLocks noGrp="1" noRot="1" noChangeAspect="1"/>
+          </p:cNvSpPr>
+          <p:nvPr>
+            <p:ph type="sldImg"/>
+          </p:nvPr>
+        </p:nvSpPr>
+        <p:spPr/>
+      </p:sp>
+      <p:sp>
+        <p:nvSpPr>
+          <p:cNvPr id="3" name="Notes Placeholder 2"/>
+          <p:cNvSpPr>
+            <a:spLocks noGrp="1"/>
+          </p:cNvSpPr>
+          <p:nvPr>
+            <p:ph type="body" idx="1"/>
+          </p:nvPr>
+        </p:nvSpPr>
+        <p:spPr/>
+        <p:txBody>
+          <a:bodyPr/>
+          <a:lstStyle/>
+          <a:p>
+            <a:r>
+              <a:rPr lang="en-US" dirty="0"/>
+              <a:t>Chapter 8 code has notifications API code</a:t>
+            </a:r>
+          </a:p>
+          <a:p>
+            <a:endParaRPr lang="en-US" dirty="0"/>
+          </a:p>
+        </p:txBody>
+      </p:sp>
+      <p:sp>
+        <p:nvSpPr>
+          <p:cNvPr id="4" name="Slide Number Placeholder 3"/>
+          <p:cNvSpPr>
+            <a:spLocks noGrp="1"/>
+          </p:cNvSpPr>
+          <p:nvPr>
+            <p:ph type="sldNum" sz="quarter" idx="5"/>
+          </p:nvPr>
+        </p:nvSpPr>
+        <p:spPr/>
+        <p:txBody>
+          <a:bodyPr/>
+          <a:lstStyle/>
+          <a:p>
+            <a:fld id="{B24C3CE9-E430-0042-A738-50E8105E4176}" type="slidenum">
+              <a:rPr lang="en-US" smtClean="0"/>
+              <a:t>8</a:t>
+            </a:fld>
+            <a:endParaRPr lang="en-US"/>
+          </a:p>
+        </p:txBody>
+      </p:sp>
+    </p:spTree>
+    <p:extLst>
+      <p:ext uri="{BB962C8B-B14F-4D97-AF65-F5344CB8AC3E}">
+        <p14:creationId xmlns:p14="http://schemas.microsoft.com/office/powerpoint/2010/main" val="866739980"/>
+      </p:ext>
+    </p:extLst>
+  </p:cSld>
+  <p:clrMapOvr>
+    <a:masterClrMapping/>
+  </p:clrMapOvr>
+</p:notes>
+</file>
+
+<file path=ppt/notesSlides/notesSlide7.xml><?xml version="1.0" encoding="utf-8"?>
+<p:notes xmlns:a="http://schemas.openxmlformats.org/drawingml/2006/main" xmlns:r="http://schemas.openxmlformats.org/officeDocument/2006/relationships" xmlns:p="http://schemas.openxmlformats.org/presentationml/2006/main">
+  <p:cSld>
+    <p:spTree>
+      <p:nvGrpSpPr>
+        <p:cNvPr id="1" name=""/>
+        <p:cNvGrpSpPr/>
+        <p:nvPr/>
+      </p:nvGrpSpPr>
+      <p:grpSpPr>
+        <a:xfrm>
+          <a:off x="0" y="0"/>
+          <a:ext cx="0" cy="0"/>
+          <a:chOff x="0" y="0"/>
+          <a:chExt cx="0" cy="0"/>
+        </a:xfrm>
+      </p:grpSpPr>
+      <p:sp>
+        <p:nvSpPr>
+          <p:cNvPr id="2" name="Slide Image Placeholder 1"/>
+          <p:cNvSpPr>
+            <a:spLocks noGrp="1" noRot="1" noChangeAspect="1"/>
+          </p:cNvSpPr>
+          <p:nvPr>
+            <p:ph type="sldImg"/>
+          </p:nvPr>
+        </p:nvSpPr>
+        <p:spPr/>
+      </p:sp>
+      <p:sp>
+        <p:nvSpPr>
+          <p:cNvPr id="3" name="Notes Placeholder 2"/>
+          <p:cNvSpPr>
+            <a:spLocks noGrp="1"/>
+          </p:cNvSpPr>
+          <p:nvPr>
+            <p:ph type="body" idx="1"/>
+          </p:nvPr>
+        </p:nvSpPr>
+        <p:spPr/>
+        <p:txBody>
+          <a:bodyPr/>
+          <a:lstStyle/>
+          <a:p>
+            <a:r>
+              <a:rPr lang="en-US" dirty="0"/>
+              <a:t>Chapter 12 has WebView2 with Blazor demo</a:t>
+            </a:r>
+          </a:p>
+          <a:p>
+            <a:endParaRPr lang="en-US" dirty="0"/>
+          </a:p>
+        </p:txBody>
+      </p:sp>
+      <p:sp>
+        <p:nvSpPr>
+          <p:cNvPr id="4" name="Slide Number Placeholder 3"/>
+          <p:cNvSpPr>
+            <a:spLocks noGrp="1"/>
+          </p:cNvSpPr>
+          <p:nvPr>
+            <p:ph type="sldNum" sz="quarter" idx="5"/>
+          </p:nvPr>
+        </p:nvSpPr>
+        <p:spPr/>
+        <p:txBody>
+          <a:bodyPr/>
+          <a:lstStyle/>
+          <a:p>
+            <a:fld id="{B24C3CE9-E430-0042-A738-50E8105E4176}" type="slidenum">
+              <a:rPr lang="en-US" smtClean="0"/>
+              <a:t>9</a:t>
+            </a:fld>
+            <a:endParaRPr lang="en-US"/>
+          </a:p>
+        </p:txBody>
+      </p:sp>
+    </p:spTree>
+    <p:extLst>
+      <p:ext uri="{BB962C8B-B14F-4D97-AF65-F5344CB8AC3E}">
+        <p14:creationId xmlns:p14="http://schemas.microsoft.com/office/powerpoint/2010/main" val="3736469973"/>
+      </p:ext>
+    </p:extLst>
+  </p:cSld>
+  <p:clrMapOvr>
+    <a:masterClrMapping/>
+  </p:clrMapOvr>
+</p:notes>
+</file>
+
+<file path=ppt/notesSlides/notesSlide8.xml><?xml version="1.0" encoding="utf-8"?>
+<p:notes xmlns:a="http://schemas.openxmlformats.org/drawingml/2006/main" xmlns:r="http://schemas.openxmlformats.org/officeDocument/2006/relationships" xmlns:p="http://schemas.openxmlformats.org/presentationml/2006/main">
+  <p:cSld>
+    <p:spTree>
+      <p:nvGrpSpPr>
+        <p:cNvPr id="1" name=""/>
+        <p:cNvGrpSpPr/>
+        <p:nvPr/>
+      </p:nvGrpSpPr>
+      <p:grpSpPr>
+        <a:xfrm>
+          <a:off x="0" y="0"/>
+          <a:ext cx="0" cy="0"/>
+          <a:chOff x="0" y="0"/>
+          <a:chExt cx="0" cy="0"/>
+        </a:xfrm>
+      </p:grpSpPr>
+      <p:sp>
+        <p:nvSpPr>
+          <p:cNvPr id="2" name="Slide Image Placeholder 1"/>
+          <p:cNvSpPr>
+            <a:spLocks noGrp="1" noRot="1" noChangeAspect="1"/>
+          </p:cNvSpPr>
+          <p:nvPr>
+            <p:ph type="sldImg"/>
+          </p:nvPr>
+        </p:nvSpPr>
+        <p:spPr/>
+      </p:sp>
+      <p:sp>
+        <p:nvSpPr>
+          <p:cNvPr id="3" name="Notes Placeholder 2"/>
+          <p:cNvSpPr>
+            <a:spLocks noGrp="1"/>
+          </p:cNvSpPr>
+          <p:nvPr>
+            <p:ph type="body" idx="1"/>
+          </p:nvPr>
+        </p:nvSpPr>
+        <p:spPr/>
+        <p:txBody>
+          <a:bodyPr/>
+          <a:lstStyle/>
+          <a:p>
+            <a:endParaRPr lang="en-US" dirty="0"/>
+          </a:p>
+        </p:txBody>
+      </p:sp>
+      <p:sp>
+        <p:nvSpPr>
+          <p:cNvPr id="4" name="Slide Number Placeholder 3"/>
+          <p:cNvSpPr>
+            <a:spLocks noGrp="1"/>
+          </p:cNvSpPr>
+          <p:nvPr>
+            <p:ph type="sldNum" sz="quarter" idx="5"/>
+          </p:nvPr>
+        </p:nvSpPr>
+        <p:spPr/>
+        <p:txBody>
+          <a:bodyPr/>
+          <a:lstStyle/>
+          <a:p>
+            <a:fld id="{B24C3CE9-E430-0042-A738-50E8105E4176}" type="slidenum">
+              <a:rPr lang="en-US" smtClean="0"/>
+              <a:t>10</a:t>
+            </a:fld>
+            <a:endParaRPr lang="en-US"/>
+          </a:p>
+        </p:txBody>
+      </p:sp>
+    </p:spTree>
+    <p:extLst>
+      <p:ext uri="{BB962C8B-B14F-4D97-AF65-F5344CB8AC3E}">
+        <p14:creationId xmlns:p14="http://schemas.microsoft.com/office/powerpoint/2010/main" val="429697880"/>
+      </p:ext>
+    </p:extLst>
+  </p:cSld>
+  <p:clrMapOvr>
+    <a:masterClrMapping/>
+  </p:clrMapOvr>
+</p:notes>
+</file>
+
+<file path=ppt/notesSlides/notesSlide9.xml><?xml version="1.0" encoding="utf-8"?>
+<p:notes xmlns:a="http://schemas.openxmlformats.org/drawingml/2006/main" xmlns:r="http://schemas.openxmlformats.org/officeDocument/2006/relationships" xmlns:p="http://schemas.openxmlformats.org/presentationml/2006/main">
+  <p:cSld>
+    <p:spTree>
+      <p:nvGrpSpPr>
+        <p:cNvPr id="1" name=""/>
+        <p:cNvGrpSpPr/>
+        <p:nvPr/>
+      </p:nvGrpSpPr>
+      <p:grpSpPr>
+        <a:xfrm>
+          <a:off x="0" y="0"/>
+          <a:ext cx="0" cy="0"/>
+          <a:chOff x="0" y="0"/>
+          <a:chExt cx="0" cy="0"/>
+        </a:xfrm>
+      </p:grpSpPr>
+      <p:sp>
+        <p:nvSpPr>
+          <p:cNvPr id="2" name="Slide Image Placeholder 1"/>
+          <p:cNvSpPr>
+            <a:spLocks noGrp="1" noRot="1" noChangeAspect="1"/>
+          </p:cNvSpPr>
+          <p:nvPr>
+            <p:ph type="sldImg"/>
+          </p:nvPr>
+        </p:nvSpPr>
+        <p:spPr/>
+      </p:sp>
+      <p:sp>
+        <p:nvSpPr>
+          <p:cNvPr id="3" name="Notes Placeholder 2"/>
+          <p:cNvSpPr>
+            <a:spLocks noGrp="1"/>
+          </p:cNvSpPr>
+          <p:nvPr>
+            <p:ph type="body" idx="1"/>
+          </p:nvPr>
+        </p:nvSpPr>
+        <p:spPr/>
+        <p:txBody>
+          <a:bodyPr/>
+          <a:lstStyle/>
+          <a:p>
+            <a:r>
+              <a:rPr lang="en-US" dirty="0"/>
+              <a:t>Chapter 13 has Uno Platform project</a:t>
+            </a:r>
+          </a:p>
+          <a:p>
+            <a:endParaRPr lang="en-US" dirty="0"/>
+          </a:p>
+          <a:p>
+            <a:endParaRPr lang="en-US" dirty="0"/>
+          </a:p>
+          <a:p>
+            <a:endParaRPr lang="en-US" dirty="0"/>
+          </a:p>
+        </p:txBody>
+      </p:sp>
+      <p:sp>
+        <p:nvSpPr>
+          <p:cNvPr id="4" name="Slide Number Placeholder 3"/>
+          <p:cNvSpPr>
+            <a:spLocks noGrp="1"/>
+          </p:cNvSpPr>
+          <p:nvPr>
+            <p:ph type="sldNum" sz="quarter" idx="5"/>
+          </p:nvPr>
+        </p:nvSpPr>
+        <p:spPr/>
+        <p:txBody>
+          <a:bodyPr/>
+          <a:lstStyle/>
+          <a:p>
+            <a:fld id="{B24C3CE9-E430-0042-A738-50E8105E4176}" type="slidenum">
+              <a:rPr lang="en-US" smtClean="0"/>
+              <a:t>11</a:t>
+            </a:fld>
+            <a:endParaRPr lang="en-US"/>
+          </a:p>
+        </p:txBody>
+      </p:sp>
+    </p:spTree>
+    <p:extLst>
+      <p:ext uri="{BB962C8B-B14F-4D97-AF65-F5344CB8AC3E}">
+        <p14:creationId xmlns:p14="http://schemas.microsoft.com/office/powerpoint/2010/main" val="1160255955"/>
       </p:ext>
     </p:extLst>
   </p:cSld>
@@ -9728,7 +10487,7 @@
             <a:fld id="{5586B75A-687E-405C-8A0B-8D00578BA2C3}" type="datetimeFigureOut">
               <a:rPr lang="en-US" dirty="0"/>
               <a:pPr/>
-              <a:t>3/2/24</a:t>
+              <a:t>3/10/2024</a:t>
             </a:fld>
             <a:endParaRPr lang="en-US" dirty="0"/>
           </a:p>
@@ -9895,7 +10654,7 @@
             <a:fld id="{5586B75A-687E-405C-8A0B-8D00578BA2C3}" type="datetimeFigureOut">
               <a:rPr lang="en-US" dirty="0"/>
               <a:pPr/>
-              <a:t>3/2/24</a:t>
+              <a:t>3/10/2024</a:t>
             </a:fld>
             <a:endParaRPr lang="en-US" dirty="0"/>
           </a:p>
@@ -10072,7 +10831,7 @@
             <a:fld id="{5586B75A-687E-405C-8A0B-8D00578BA2C3}" type="datetimeFigureOut">
               <a:rPr lang="en-US" dirty="0"/>
               <a:pPr/>
-              <a:t>3/2/24</a:t>
+              <a:t>3/10/2024</a:t>
             </a:fld>
             <a:endParaRPr lang="en-US" dirty="0"/>
           </a:p>
@@ -10239,7 +10998,7 @@
             <a:fld id="{5586B75A-687E-405C-8A0B-8D00578BA2C3}" type="datetimeFigureOut">
               <a:rPr lang="en-US" dirty="0"/>
               <a:pPr/>
-              <a:t>3/2/24</a:t>
+              <a:t>3/10/2024</a:t>
             </a:fld>
             <a:endParaRPr lang="en-US" dirty="0"/>
           </a:p>
@@ -10494,7 +11253,7 @@
             <a:fld id="{5586B75A-687E-405C-8A0B-8D00578BA2C3}" type="datetimeFigureOut">
               <a:rPr lang="en-US" dirty="0"/>
               <a:pPr/>
-              <a:t>3/2/24</a:t>
+              <a:t>3/10/2024</a:t>
             </a:fld>
             <a:endParaRPr lang="en-US" dirty="0"/>
           </a:p>
@@ -10779,7 +11538,7 @@
             <a:fld id="{5586B75A-687E-405C-8A0B-8D00578BA2C3}" type="datetimeFigureOut">
               <a:rPr lang="en-US" dirty="0"/>
               <a:pPr/>
-              <a:t>3/2/24</a:t>
+              <a:t>3/10/2024</a:t>
             </a:fld>
             <a:endParaRPr lang="en-US" dirty="0"/>
           </a:p>
@@ -11218,7 +11977,7 @@
             <a:fld id="{5586B75A-687E-405C-8A0B-8D00578BA2C3}" type="datetimeFigureOut">
               <a:rPr lang="en-US" dirty="0"/>
               <a:pPr/>
-              <a:t>3/2/24</a:t>
+              <a:t>3/10/2024</a:t>
             </a:fld>
             <a:endParaRPr lang="en-US" dirty="0"/>
           </a:p>
@@ -11333,7 +12092,7 @@
             <a:fld id="{5586B75A-687E-405C-8A0B-8D00578BA2C3}" type="datetimeFigureOut">
               <a:rPr lang="en-US" dirty="0"/>
               <a:pPr/>
-              <a:t>3/2/24</a:t>
+              <a:t>3/10/2024</a:t>
             </a:fld>
             <a:endParaRPr lang="en-US" dirty="0"/>
           </a:p>
@@ -11425,7 +12184,7 @@
             <a:fld id="{5586B75A-687E-405C-8A0B-8D00578BA2C3}" type="datetimeFigureOut">
               <a:rPr lang="en-US" dirty="0"/>
               <a:pPr/>
-              <a:t>3/2/24</a:t>
+              <a:t>3/10/2024</a:t>
             </a:fld>
             <a:endParaRPr lang="en-US" dirty="0"/>
           </a:p>
@@ -11710,7 +12469,7 @@
             <a:fld id="{5586B75A-687E-405C-8A0B-8D00578BA2C3}" type="datetimeFigureOut">
               <a:rPr lang="en-US" dirty="0"/>
               <a:pPr/>
-              <a:t>3/2/24</a:t>
+              <a:t>3/10/2024</a:t>
             </a:fld>
             <a:endParaRPr lang="en-US" dirty="0"/>
           </a:p>
@@ -11980,7 +12739,7 @@
             <a:fld id="{5586B75A-687E-405C-8A0B-8D00578BA2C3}" type="datetimeFigureOut">
               <a:rPr lang="en-US" dirty="0"/>
               <a:pPr/>
-              <a:t>3/2/24</a:t>
+              <a:t>3/10/2024</a:t>
             </a:fld>
             <a:endParaRPr lang="en-US" dirty="0"/>
           </a:p>
@@ -12274,7 +13033,7 @@
             <a:fld id="{5586B75A-687E-405C-8A0B-8D00578BA2C3}" type="datetimeFigureOut">
               <a:rPr lang="en-US" dirty="0"/>
               <a:pPr/>
-              <a:t>3/2/24</a:t>
+              <a:t>3/10/2024</a:t>
             </a:fld>
             <a:endParaRPr lang="en-US" dirty="0"/>
           </a:p>
@@ -13197,7 +13956,7 @@
           <p:nvPr/>
         </p:nvPicPr>
         <p:blipFill rotWithShape="1">
-          <a:blip r:embed="rId2">
+          <a:blip r:embed="rId3">
             <a:duotone>
               <a:schemeClr val="bg2">
                 <a:shade val="45000"/>
@@ -13397,7 +14156,7 @@
             </a:r>
             <a:r>
               <a:rPr lang="en-US" dirty="0">
-                <a:hlinkClick r:id="rId3"/>
+                <a:hlinkClick r:id="rId4"/>
               </a:rPr>
               <a:t>https://learn.microsoft.com/en-us/dotnet/maui/windows/deployment/publish-visual-studio-folder?view=net-maui-8.0</a:t>
             </a:r>
@@ -13734,7 +14493,7 @@
           <p:nvPr/>
         </p:nvPicPr>
         <p:blipFill rotWithShape="1">
-          <a:blip r:embed="rId2">
+          <a:blip r:embed="rId3">
             <a:duotone>
               <a:schemeClr val="accent1">
                 <a:shade val="45000"/>
@@ -14073,6 +14832,14 @@
 <file path=ppt/slides/slide12.xml><?xml version="1.0" encoding="utf-8"?>
 <p:sld xmlns:a="http://schemas.openxmlformats.org/drawingml/2006/main" xmlns:r="http://schemas.openxmlformats.org/officeDocument/2006/relationships" xmlns:p="http://schemas.openxmlformats.org/presentationml/2006/main">
   <p:cSld>
+    <p:bg>
+      <p:bgPr>
+        <a:solidFill>
+          <a:schemeClr val="bg1"/>
+        </a:solidFill>
+        <a:effectLst/>
+      </p:bgPr>
+    </p:bg>
     <p:spTree>
       <p:nvGrpSpPr>
         <p:cNvPr id="1" name=""/>
@@ -14103,9 +14870,16 @@
             <p:ph type="title"/>
           </p:nvPr>
         </p:nvSpPr>
-        <p:spPr/>
+        <p:spPr>
+          <a:xfrm>
+            <a:off x="252919" y="1123837"/>
+            <a:ext cx="2947482" cy="4601183"/>
+          </a:xfrm>
+        </p:spPr>
         <p:txBody>
-          <a:bodyPr/>
+          <a:bodyPr>
+            <a:normAutofit/>
+          </a:bodyPr>
           <a:lstStyle/>
           <a:p>
             <a:r>
@@ -14130,11 +14904,16 @@
           </p:cNvGraphicFramePr>
           <p:nvPr>
             <p:ph idx="1"/>
+            <p:extLst>
+              <p:ext uri="{D42A27DB-BD31-4B8C-83A1-F6EECF244321}">
+                <p14:modId xmlns:p14="http://schemas.microsoft.com/office/powerpoint/2010/main" val="19717621"/>
+              </p:ext>
+            </p:extLst>
           </p:nvPr>
         </p:nvGraphicFramePr>
         <p:xfrm>
-          <a:off x="3869268" y="864108"/>
-          <a:ext cx="7315200" cy="5120640"/>
+          <a:off x="3759896" y="885459"/>
+          <a:ext cx="7728267" cy="5087324"/>
         </p:xfrm>
         <a:graphic>
           <a:graphicData uri="http://schemas.openxmlformats.org/drawingml/2006/diagram">
@@ -16492,7 +17271,7 @@
         </p:xfrm>
         <a:graphic>
           <a:graphicData uri="http://schemas.openxmlformats.org/drawingml/2006/diagram">
-            <dgm:relIds xmlns:dgm="http://schemas.openxmlformats.org/drawingml/2006/diagram" xmlns:r="http://schemas.openxmlformats.org/officeDocument/2006/relationships" r:dm="rId2" r:lo="rId3" r:qs="rId4" r:cs="rId5"/>
+            <dgm:relIds xmlns:dgm="http://schemas.openxmlformats.org/drawingml/2006/diagram" xmlns:r="http://schemas.openxmlformats.org/officeDocument/2006/relationships" r:dm="rId3" r:lo="rId4" r:qs="rId5" r:cs="rId6"/>
           </a:graphicData>
         </a:graphic>
       </p:graphicFrame>
@@ -16609,7 +17388,7 @@
           <p:nvPr/>
         </p:nvPicPr>
         <p:blipFill rotWithShape="1">
-          <a:blip r:embed="rId2">
+          <a:blip r:embed="rId3">
             <a:alphaModFix amt="25000"/>
           </a:blip>
           <a:srcRect t="8372" b="7358"/>
@@ -16725,7 +17504,7 @@
                 <a:solidFill>
                   <a:schemeClr val="tx1"/>
                 </a:solidFill>
-                <a:hlinkClick r:id="rId3"/>
+                <a:hlinkClick r:id="rId4"/>
               </a:rPr>
               <a:t>https://github.com/CommunityToolkit/Windows</a:t>
             </a:r>
@@ -16749,7 +17528,7 @@
                 <a:solidFill>
                   <a:schemeClr val="tx1"/>
                 </a:solidFill>
-                <a:hlinkClick r:id="rId4"/>
+                <a:hlinkClick r:id="rId5"/>
               </a:rPr>
               <a:t>https://learn.microsoft.com/dotnet/communitytoolkit/windows/</a:t>
             </a:r>
@@ -16773,7 +17552,7 @@
                 <a:solidFill>
                   <a:schemeClr val="tx1"/>
                 </a:solidFill>
-                <a:hlinkClick r:id="rId5"/>
+                <a:hlinkClick r:id="rId6"/>
               </a:rPr>
               <a:t>https://www.microsoft.com/store/apps/9nblggh4tlcq</a:t>
             </a:r>
@@ -17034,7 +17813,7 @@
           <p:nvPr/>
         </p:nvPicPr>
         <p:blipFill rotWithShape="1">
-          <a:blip r:embed="rId2"/>
+          <a:blip r:embed="rId3"/>
           <a:srcRect t="15709" r="-1" b="-1"/>
           <a:stretch/>
         </p:blipFill>
@@ -17562,7 +18341,7 @@
             </a:r>
             <a:r>
               <a:rPr lang="en-US" sz="1400">
-                <a:hlinkClick r:id="rId2"/>
+                <a:hlinkClick r:id="rId3"/>
               </a:rPr>
               <a:t>https://learn.microsoft.com/en-us/windows/apps/windows-app-sdk/stable-channel#xaml-islands-no-longer-experimental</a:t>
             </a:r>
@@ -17610,7 +18389,7 @@
             </a:r>
             <a:r>
               <a:rPr lang="en-US" sz="1400">
-                <a:hlinkClick r:id="rId3"/>
+                <a:hlinkClick r:id="rId4"/>
               </a:rPr>
               <a:t>https://learn.microsoft.com/microsoft-edge/webview2/get-started/winui</a:t>
             </a:r>
@@ -18255,4 +19034,10 @@
     </a:ext>
   </a:extLst>
 </a:theme>
+</file>
+
+<file path=docMetadata/LabelInfo.xml><?xml version="1.0" encoding="utf-8"?>
+<clbl:labelList xmlns:clbl="http://schemas.microsoft.com/office/2020/mipLabelMetadata">
+  <clbl:label id="{f42aa342-8706-4288-bd11-ebb85995028c}" enabled="1" method="Standard" siteId="{72f988bf-86f1-41af-91ab-2d7cd011db47}" contentBits="0" removed="0"/>
+</clbl:labelList>
 </file>
</xml_diff>